<commit_message>
#599 added a short chapter on local testing
</commit_message>
<xml_diff>
--- a/Articles/599/images/PythonAsAService.pptx
+++ b/Articles/599/images/PythonAsAService.pptx
@@ -4946,7 +4946,7 @@
           <a:p>
             <a:r>
               <a:rPr lang="en-GB" dirty="0"/>
-              <a:t>Error validation using </a:t>
+              <a:t>Data validation using </a:t>
             </a:r>
             <a:r>
               <a:rPr lang="en-GB" dirty="0" err="1"/>
@@ -4967,13 +4967,15 @@
           <a:p>
             <a:r>
               <a:rPr lang="en-GB" dirty="0"/>
-              <a:t>List available container (templates) for starting </a:t>
-            </a:r>
-            <a:r>
-              <a:rPr lang="en-GB"/>
-              <a:t>a service.</a:t>
-            </a:r>
-            <a:endParaRPr lang="en-GB" dirty="0"/>
+              <a:t>Let’s create a process to handle not present libraries and wanted by some app developer.</a:t>
+            </a:r>
+          </a:p>
+          <a:p>
+            <a:pPr lvl="1"/>
+            <a:r>
+              <a:rPr lang="en-GB" dirty="0"/>
+              <a:t>List available container (templates) for starting a service.</a:t>
+            </a:r>
           </a:p>
           <a:p>
             <a:endParaRPr lang="en-GB" dirty="0"/>
@@ -6009,18 +6011,18 @@
 </file>
 
 <file path=customXml/item1.xml><?xml version="1.0" encoding="utf-8"?>
-<p:properties xmlns:p="http://schemas.microsoft.com/office/2006/metadata/properties" xmlns:xsi="http://www.w3.org/2001/XMLSchema-instance" xmlns:pc="http://schemas.microsoft.com/office/infopath/2007/PartnerControls">
-  <documentManagement/>
-</p:properties>
-</file>
-
-<file path=customXml/item2.xml><?xml version="1.0" encoding="utf-8"?>
 <?mso-contentType ?>
 <FormTemplates xmlns="http://schemas.microsoft.com/sharepoint/v3/contenttype/forms">
   <Display>DocumentLibraryForm</Display>
   <Edit>DocumentLibraryForm</Edit>
   <New>DocumentLibraryForm</New>
 </FormTemplates>
+</file>
+
+<file path=customXml/item2.xml><?xml version="1.0" encoding="utf-8"?>
+<p:properties xmlns:p="http://schemas.microsoft.com/office/2006/metadata/properties" xmlns:xsi="http://www.w3.org/2001/XMLSchema-instance" xmlns:pc="http://schemas.microsoft.com/office/infopath/2007/PartnerControls">
+  <documentManagement/>
+</p:properties>
 </file>
 
 <file path=customXml/item3.xml><?xml version="1.0" encoding="utf-8"?>
@@ -6178,6 +6180,14 @@
 </file>
 
 <file path=customXml/itemProps1.xml><?xml version="1.0" encoding="utf-8"?>
+<ds:datastoreItem xmlns:ds="http://schemas.openxmlformats.org/officeDocument/2006/customXml" ds:itemID="{74BCA57B-8451-400D-AF6D-A9DBB4806AF2}">
+  <ds:schemaRefs>
+    <ds:schemaRef ds:uri="http://schemas.microsoft.com/sharepoint/v3/contenttype/forms"/>
+  </ds:schemaRefs>
+</ds:datastoreItem>
+</file>
+
+<file path=customXml/itemProps2.xml><?xml version="1.0" encoding="utf-8"?>
 <ds:datastoreItem xmlns:ds="http://schemas.openxmlformats.org/officeDocument/2006/customXml" ds:itemID="{F4BD4880-0C9A-491D-872C-CB84E58DA4AE}">
   <ds:schemaRefs>
     <ds:schemaRef ds:uri="67d1ba68-3275-44c2-9ddb-2f8511f2ccbb"/>
@@ -6189,14 +6199,6 @@
     <ds:schemaRef ds:uri="http://schemas.microsoft.com/office/2006/metadata/properties"/>
     <ds:schemaRef ds:uri="http://www.w3.org/XML/1998/namespace"/>
     <ds:schemaRef ds:uri="http://purl.org/dc/dcmitype/"/>
-  </ds:schemaRefs>
-</ds:datastoreItem>
-</file>
-
-<file path=customXml/itemProps2.xml><?xml version="1.0" encoding="utf-8"?>
-<ds:datastoreItem xmlns:ds="http://schemas.openxmlformats.org/officeDocument/2006/customXml" ds:itemID="{74BCA57B-8451-400D-AF6D-A9DBB4806AF2}">
-  <ds:schemaRefs>
-    <ds:schemaRef ds:uri="http://schemas.microsoft.com/sharepoint/v3/contenttype/forms"/>
   </ds:schemaRefs>
 </ds:datastoreItem>
 </file>

</xml_diff>

<commit_message>
#599: Modularization and adding an article #623 about the example. (not finished)
</commit_message>
<xml_diff>
--- a/Articles/599/images/PythonAsAService.pptx
+++ b/Articles/599/images/PythonAsAService.pptx
@@ -5,17 +5,18 @@
     <p:sldMasterId id="2147483684" r:id="rId4"/>
   </p:sldMasterIdLst>
   <p:notesMasterIdLst>
-    <p:notesMasterId r:id="rId10"/>
+    <p:notesMasterId r:id="rId11"/>
   </p:notesMasterIdLst>
   <p:handoutMasterIdLst>
-    <p:handoutMasterId r:id="rId11"/>
+    <p:handoutMasterId r:id="rId12"/>
   </p:handoutMasterIdLst>
   <p:sldIdLst>
     <p:sldId id="256" r:id="rId5"/>
-    <p:sldId id="257" r:id="rId6"/>
-    <p:sldId id="258" r:id="rId7"/>
-    <p:sldId id="259" r:id="rId8"/>
-    <p:sldId id="260" r:id="rId9"/>
+    <p:sldId id="261" r:id="rId6"/>
+    <p:sldId id="257" r:id="rId7"/>
+    <p:sldId id="258" r:id="rId8"/>
+    <p:sldId id="259" r:id="rId9"/>
+    <p:sldId id="260" r:id="rId10"/>
   </p:sldIdLst>
   <p:sldSz cx="12192000" cy="6858000"/>
   <p:notesSz cx="6858000" cy="9144000"/>
@@ -251,7 +252,7 @@
             <a:fld id="{B1603AB5-52B7-8045-BEFE-97F8347DAEAC}" type="datetimeFigureOut">
               <a:rPr lang="en-US" smtClean="0"/>
               <a:pPr/>
-              <a:t>8/31/2023</a:t>
+              <a:t>3/4/2024</a:t>
             </a:fld>
             <a:endParaRPr lang="en-US"/>
           </a:p>
@@ -419,7 +420,7 @@
             <a:fld id="{EFF03303-0379-0E48-9B93-EC7286F8FEE5}" type="datetimeFigureOut">
               <a:rPr lang="en-US" smtClean="0"/>
               <a:pPr/>
-              <a:t>8/31/2023</a:t>
+              <a:t>3/4/2024</a:t>
             </a:fld>
             <a:endParaRPr lang="en-US"/>
           </a:p>
@@ -1450,6 +1451,228 @@
 </p:sldLayout>
 </file>
 
+<file path=ppt/slideLayouts/slideLayout13.xml><?xml version="1.0" encoding="utf-8"?>
+<p:sldLayout xmlns:a="http://schemas.openxmlformats.org/drawingml/2006/main" xmlns:r="http://schemas.openxmlformats.org/officeDocument/2006/relationships" xmlns:p="http://schemas.openxmlformats.org/presentationml/2006/main" type="title">
+  <p:cSld name="Title Slide">
+    <p:spTree>
+      <p:nvGrpSpPr>
+        <p:cNvPr id="1" name=""/>
+        <p:cNvGrpSpPr/>
+        <p:nvPr/>
+      </p:nvGrpSpPr>
+      <p:grpSpPr>
+        <a:xfrm>
+          <a:off x="0" y="0"/>
+          <a:ext cx="0" cy="0"/>
+          <a:chOff x="0" y="0"/>
+          <a:chExt cx="0" cy="0"/>
+        </a:xfrm>
+      </p:grpSpPr>
+      <p:sp>
+        <p:nvSpPr>
+          <p:cNvPr id="2" name="Title 1">
+            <a:extLst>
+              <a:ext uri="{FF2B5EF4-FFF2-40B4-BE49-F238E27FC236}">
+                <a16:creationId xmlns:a16="http://schemas.microsoft.com/office/drawing/2014/main" id="{3BA15450-7E44-0130-71AE-935C9A4D22B9}"/>
+              </a:ext>
+            </a:extLst>
+          </p:cNvPr>
+          <p:cNvSpPr>
+            <a:spLocks noGrp="1"/>
+          </p:cNvSpPr>
+          <p:nvPr>
+            <p:ph type="ctrTitle"/>
+          </p:nvPr>
+        </p:nvSpPr>
+        <p:spPr>
+          <a:xfrm>
+            <a:off x="1524000" y="1122363"/>
+            <a:ext cx="9144000" cy="2387600"/>
+          </a:xfrm>
+        </p:spPr>
+        <p:txBody>
+          <a:bodyPr anchor="b"/>
+          <a:lstStyle>
+            <a:lvl1pPr algn="ctr">
+              <a:defRPr sz="6000"/>
+            </a:lvl1pPr>
+          </a:lstStyle>
+          <a:p>
+            <a:r>
+              <a:rPr lang="en-US"/>
+              <a:t>Click to edit Master title style</a:t>
+            </a:r>
+            <a:endParaRPr lang="en-NL"/>
+          </a:p>
+        </p:txBody>
+      </p:sp>
+      <p:sp>
+        <p:nvSpPr>
+          <p:cNvPr id="3" name="Subtitle 2">
+            <a:extLst>
+              <a:ext uri="{FF2B5EF4-FFF2-40B4-BE49-F238E27FC236}">
+                <a16:creationId xmlns:a16="http://schemas.microsoft.com/office/drawing/2014/main" id="{F1CC9C99-433B-73FE-2911-D19A6F6DDBC5}"/>
+              </a:ext>
+            </a:extLst>
+          </p:cNvPr>
+          <p:cNvSpPr>
+            <a:spLocks noGrp="1"/>
+          </p:cNvSpPr>
+          <p:nvPr>
+            <p:ph type="subTitle" idx="1"/>
+          </p:nvPr>
+        </p:nvSpPr>
+        <p:spPr>
+          <a:xfrm>
+            <a:off x="1524000" y="3602038"/>
+            <a:ext cx="9144000" cy="1655762"/>
+          </a:xfrm>
+        </p:spPr>
+        <p:txBody>
+          <a:bodyPr/>
+          <a:lstStyle>
+            <a:lvl1pPr marL="0" indent="0" algn="ctr">
+              <a:buNone/>
+              <a:defRPr sz="2400"/>
+            </a:lvl1pPr>
+            <a:lvl2pPr marL="457200" indent="0" algn="ctr">
+              <a:buNone/>
+              <a:defRPr sz="2000"/>
+            </a:lvl2pPr>
+            <a:lvl3pPr marL="914400" indent="0" algn="ctr">
+              <a:buNone/>
+              <a:defRPr sz="1800"/>
+            </a:lvl3pPr>
+            <a:lvl4pPr marL="1371600" indent="0" algn="ctr">
+              <a:buNone/>
+              <a:defRPr sz="1600"/>
+            </a:lvl4pPr>
+            <a:lvl5pPr marL="1828800" indent="0" algn="ctr">
+              <a:buNone/>
+              <a:defRPr sz="1600"/>
+            </a:lvl5pPr>
+            <a:lvl6pPr marL="2286000" indent="0" algn="ctr">
+              <a:buNone/>
+              <a:defRPr sz="1600"/>
+            </a:lvl6pPr>
+            <a:lvl7pPr marL="2743200" indent="0" algn="ctr">
+              <a:buNone/>
+              <a:defRPr sz="1600"/>
+            </a:lvl7pPr>
+            <a:lvl8pPr marL="3200400" indent="0" algn="ctr">
+              <a:buNone/>
+              <a:defRPr sz="1600"/>
+            </a:lvl8pPr>
+            <a:lvl9pPr marL="3657600" indent="0" algn="ctr">
+              <a:buNone/>
+              <a:defRPr sz="1600"/>
+            </a:lvl9pPr>
+          </a:lstStyle>
+          <a:p>
+            <a:r>
+              <a:rPr lang="en-US"/>
+              <a:t>Click to edit Master subtitle style</a:t>
+            </a:r>
+            <a:endParaRPr lang="en-NL"/>
+          </a:p>
+        </p:txBody>
+      </p:sp>
+      <p:sp>
+        <p:nvSpPr>
+          <p:cNvPr id="4" name="Date Placeholder 3">
+            <a:extLst>
+              <a:ext uri="{FF2B5EF4-FFF2-40B4-BE49-F238E27FC236}">
+                <a16:creationId xmlns:a16="http://schemas.microsoft.com/office/drawing/2014/main" id="{3857A261-A192-D1F4-08EF-C5536DCAE76C}"/>
+              </a:ext>
+            </a:extLst>
+          </p:cNvPr>
+          <p:cNvSpPr>
+            <a:spLocks noGrp="1"/>
+          </p:cNvSpPr>
+          <p:nvPr>
+            <p:ph type="dt" sz="half" idx="10"/>
+          </p:nvPr>
+        </p:nvSpPr>
+        <p:spPr/>
+        <p:txBody>
+          <a:bodyPr/>
+          <a:lstStyle/>
+          <a:p>
+            <a:fld id="{E210160B-521D-4D45-B779-2595A8683FA3}" type="datetimeFigureOut">
+              <a:rPr lang="en-NL" smtClean="0"/>
+              <a:t>04/03/2024</a:t>
+            </a:fld>
+            <a:endParaRPr lang="en-NL"/>
+          </a:p>
+        </p:txBody>
+      </p:sp>
+      <p:sp>
+        <p:nvSpPr>
+          <p:cNvPr id="5" name="Footer Placeholder 4">
+            <a:extLst>
+              <a:ext uri="{FF2B5EF4-FFF2-40B4-BE49-F238E27FC236}">
+                <a16:creationId xmlns:a16="http://schemas.microsoft.com/office/drawing/2014/main" id="{6859E367-3480-092C-15E8-A6B886AAB619}"/>
+              </a:ext>
+            </a:extLst>
+          </p:cNvPr>
+          <p:cNvSpPr>
+            <a:spLocks noGrp="1"/>
+          </p:cNvSpPr>
+          <p:nvPr>
+            <p:ph type="ftr" sz="quarter" idx="11"/>
+          </p:nvPr>
+        </p:nvSpPr>
+        <p:spPr/>
+        <p:txBody>
+          <a:bodyPr/>
+          <a:lstStyle/>
+          <a:p>
+            <a:endParaRPr lang="en-NL"/>
+          </a:p>
+        </p:txBody>
+      </p:sp>
+      <p:sp>
+        <p:nvSpPr>
+          <p:cNvPr id="6" name="Slide Number Placeholder 5">
+            <a:extLst>
+              <a:ext uri="{FF2B5EF4-FFF2-40B4-BE49-F238E27FC236}">
+                <a16:creationId xmlns:a16="http://schemas.microsoft.com/office/drawing/2014/main" id="{396E69F6-D486-E58D-66E0-E6F87EE16BA5}"/>
+              </a:ext>
+            </a:extLst>
+          </p:cNvPr>
+          <p:cNvSpPr>
+            <a:spLocks noGrp="1"/>
+          </p:cNvSpPr>
+          <p:nvPr>
+            <p:ph type="sldNum" sz="quarter" idx="12"/>
+          </p:nvPr>
+        </p:nvSpPr>
+        <p:spPr/>
+        <p:txBody>
+          <a:bodyPr/>
+          <a:lstStyle/>
+          <a:p>
+            <a:fld id="{4EF0B0E8-7778-4A72-90AF-58E7B9F10958}" type="slidenum">
+              <a:rPr lang="en-NL" smtClean="0"/>
+              <a:t>‹#›</a:t>
+            </a:fld>
+            <a:endParaRPr lang="en-NL"/>
+          </a:p>
+        </p:txBody>
+      </p:sp>
+    </p:spTree>
+    <p:extLst>
+      <p:ext uri="{BB962C8B-B14F-4D97-AF65-F5344CB8AC3E}">
+        <p14:creationId xmlns:p14="http://schemas.microsoft.com/office/powerpoint/2010/main" val="305604389"/>
+      </p:ext>
+    </p:extLst>
+  </p:cSld>
+  <p:clrMapOvr>
+    <a:masterClrMapping/>
+  </p:clrMapOvr>
+</p:sldLayout>
+</file>
+
 <file path=ppt/slideLayouts/slideLayout2.xml><?xml version="1.0" encoding="utf-8"?>
 <p:sldLayout xmlns:a="http://schemas.openxmlformats.org/drawingml/2006/main" xmlns:r="http://schemas.openxmlformats.org/officeDocument/2006/relationships" xmlns:p="http://schemas.openxmlformats.org/presentationml/2006/main" preserve="1" userDrawn="1">
   <p:cSld name="Title Black - 1">
@@ -3790,7 +4013,7 @@
           <p:nvPr userDrawn="1"/>
         </p:nvPicPr>
         <p:blipFill>
-          <a:blip r:embed="rId14">
+          <a:blip r:embed="rId15">
             <a:extLst>
               <a:ext uri="{28A0092B-C50C-407E-A947-70E740481C1C}">
                 <a14:useLocalDpi xmlns:a14="http://schemas.microsoft.com/office/drawing/2010/main" val="0"/>
@@ -3832,6 +4055,7 @@
     <p:sldLayoutId id="2147483741" r:id="rId10"/>
     <p:sldLayoutId id="2147483746" r:id="rId11"/>
     <p:sldLayoutId id="2147483747" r:id="rId12"/>
+    <p:sldLayoutId id="2147483748" r:id="rId13"/>
   </p:sldLayoutIdLst>
   <p:hf hdr="0"/>
   <p:txStyles>
@@ -4324,179 +4548,835 @@
           <a:chExt cx="0" cy="0"/>
         </a:xfrm>
       </p:grpSpPr>
-      <p:sp>
-        <p:nvSpPr>
-          <p:cNvPr id="2" name="Title 1">
+      <p:pic>
+        <p:nvPicPr>
+          <p:cNvPr id="1026" name="Picture 2">
             <a:extLst>
               <a:ext uri="{FF2B5EF4-FFF2-40B4-BE49-F238E27FC236}">
-                <a16:creationId xmlns:a16="http://schemas.microsoft.com/office/drawing/2014/main" id="{6E57F283-E630-AC37-024F-A59E6C87B4D8}"/>
+                <a16:creationId xmlns:a16="http://schemas.microsoft.com/office/drawing/2014/main" id="{F68B260B-1D82-E54C-6ACF-966415D5AEE1}"/>
               </a:ext>
             </a:extLst>
           </p:cNvPr>
-          <p:cNvSpPr>
-            <a:spLocks noGrp="1"/>
-          </p:cNvSpPr>
-          <p:nvPr>
-            <p:ph type="title"/>
-          </p:nvPr>
-        </p:nvSpPr>
-        <p:spPr/>
-        <p:txBody>
-          <a:bodyPr/>
-          <a:lstStyle/>
-          <a:p>
-            <a:r>
-              <a:rPr lang="en-GB" dirty="0"/>
-              <a:t>Python App</a:t>
-            </a:r>
-            <a:endParaRPr lang="en-NL" dirty="0"/>
-          </a:p>
-        </p:txBody>
-      </p:sp>
-      <p:sp>
-        <p:nvSpPr>
-          <p:cNvPr id="3" name="Content Placeholder 2">
+          <p:cNvPicPr>
+            <a:picLocks noChangeAspect="1" noChangeArrowheads="1"/>
+          </p:cNvPicPr>
+          <p:nvPr/>
+        </p:nvPicPr>
+        <p:blipFill>
+          <a:blip r:embed="rId2">
+            <a:extLst>
+              <a:ext uri="{28A0092B-C50C-407E-A947-70E740481C1C}">
+                <a14:useLocalDpi xmlns:a14="http://schemas.microsoft.com/office/drawing/2010/main" val="0"/>
+              </a:ext>
+            </a:extLst>
+          </a:blip>
+          <a:srcRect/>
+          <a:stretch>
+            <a:fillRect/>
+          </a:stretch>
+        </p:blipFill>
+        <p:spPr bwMode="auto">
+          <a:xfrm>
+            <a:off x="689610" y="-1255824"/>
+            <a:ext cx="10172700" cy="3362325"/>
+          </a:xfrm>
+          <a:prstGeom prst="rect">
+            <a:avLst/>
+          </a:prstGeom>
+          <a:noFill/>
+          <a:extLst>
+            <a:ext uri="{909E8E84-426E-40DD-AFC4-6F175D3DCCD1}">
+              <a14:hiddenFill xmlns:a14="http://schemas.microsoft.com/office/drawing/2010/main">
+                <a:solidFill>
+                  <a:srgbClr val="FFFFFF"/>
+                </a:solidFill>
+              </a14:hiddenFill>
+            </a:ext>
+          </a:extLst>
+        </p:spPr>
+      </p:pic>
+      <p:sp>
+        <p:nvSpPr>
+          <p:cNvPr id="5" name="Rectangle 4">
             <a:extLst>
               <a:ext uri="{FF2B5EF4-FFF2-40B4-BE49-F238E27FC236}">
-                <a16:creationId xmlns:a16="http://schemas.microsoft.com/office/drawing/2014/main" id="{63116121-158E-B5B1-75CF-C9736A15DB6E}"/>
+                <a16:creationId xmlns:a16="http://schemas.microsoft.com/office/drawing/2014/main" id="{FED839CB-63F4-B2D1-16BB-426C15A8BEEE}"/>
               </a:ext>
             </a:extLst>
           </p:cNvPr>
-          <p:cNvSpPr>
-            <a:spLocks noGrp="1"/>
-          </p:cNvSpPr>
-          <p:nvPr>
-            <p:ph idx="1"/>
-          </p:nvPr>
-        </p:nvSpPr>
-        <p:spPr/>
-        <p:txBody>
-          <a:bodyPr/>
+          <p:cNvSpPr/>
+          <p:nvPr/>
+        </p:nvSpPr>
+        <p:spPr>
+          <a:xfrm>
+            <a:off x="8932696" y="2504221"/>
+            <a:ext cx="1577603" cy="3121572"/>
+          </a:xfrm>
+          <a:prstGeom prst="rect">
+            <a:avLst/>
+          </a:prstGeom>
+          <a:solidFill>
+            <a:schemeClr val="accent2"/>
+          </a:solidFill>
+          <a:ln>
+            <a:noFill/>
+          </a:ln>
+        </p:spPr>
+        <p:style>
+          <a:lnRef idx="0">
+            <a:scrgbClr r="0" g="0" b="0"/>
+          </a:lnRef>
+          <a:fillRef idx="0">
+            <a:scrgbClr r="0" g="0" b="0"/>
+          </a:fillRef>
+          <a:effectRef idx="0">
+            <a:scrgbClr r="0" g="0" b="0"/>
+          </a:effectRef>
+          <a:fontRef idx="minor">
+            <a:schemeClr val="lt1"/>
+          </a:fontRef>
+        </p:style>
+        <p:txBody>
+          <a:bodyPr rtlCol="0" anchor="ctr"/>
           <a:lstStyle/>
           <a:p>
-            <a:r>
-              <a:rPr lang="en-GB" dirty="0" err="1"/>
-              <a:t>Pydantic</a:t>
-            </a:r>
-            <a:endParaRPr lang="en-GB" dirty="0"/>
-          </a:p>
-          <a:p>
-            <a:pPr lvl="1"/>
-            <a:r>
-              <a:rPr lang="en-GB" dirty="0" err="1"/>
-              <a:t>Modeling</a:t>
-            </a:r>
-            <a:r>
-              <a:rPr lang="en-GB" dirty="0"/>
-              <a:t> of classes used in interface</a:t>
-            </a:r>
-          </a:p>
-          <a:p>
-            <a:r>
-              <a:rPr lang="en-GB" dirty="0" err="1"/>
-              <a:t>FastAPI</a:t>
-            </a:r>
-            <a:endParaRPr lang="en-GB" dirty="0"/>
-          </a:p>
-          <a:p>
-            <a:pPr lvl="1"/>
-            <a:r>
-              <a:rPr lang="en-GB" dirty="0"/>
-              <a:t>Construct </a:t>
-            </a:r>
-            <a:r>
-              <a:rPr lang="en-GB" dirty="0" err="1"/>
-              <a:t>RestAPI</a:t>
-            </a:r>
-            <a:endParaRPr lang="en-GB" dirty="0"/>
-          </a:p>
-          <a:p>
-            <a:r>
-              <a:rPr lang="en-GB" dirty="0" err="1"/>
-              <a:t>Uvicorn</a:t>
-            </a:r>
-            <a:endParaRPr lang="en-GB" dirty="0"/>
-          </a:p>
-          <a:p>
-            <a:pPr lvl="1"/>
-            <a:r>
-              <a:rPr lang="en-GB" dirty="0"/>
-              <a:t>Start Service</a:t>
-            </a:r>
-          </a:p>
-          <a:p>
-            <a:r>
-              <a:rPr lang="en-GB" dirty="0"/>
-              <a:t>Essential Extras</a:t>
-            </a:r>
-          </a:p>
-          <a:p>
-            <a:pPr lvl="1"/>
-            <a:r>
-              <a:rPr lang="en-GB" dirty="0" err="1"/>
-              <a:t>OpenAPI</a:t>
-            </a:r>
-            <a:r>
-              <a:rPr lang="en-GB" dirty="0"/>
-              <a:t> 3.1 interface spec</a:t>
-            </a:r>
-          </a:p>
-          <a:p>
-            <a:pPr lvl="1"/>
-            <a:r>
-              <a:rPr lang="en-GB" dirty="0"/>
-              <a:t>Interface Doc</a:t>
-            </a:r>
-          </a:p>
-          <a:p>
-            <a:pPr lvl="1"/>
-            <a:endParaRPr lang="en-GB" dirty="0"/>
-          </a:p>
-          <a:p>
-            <a:pPr marL="0" indent="0">
-              <a:buNone/>
-            </a:pPr>
-            <a:endParaRPr lang="en-GB" dirty="0"/>
-          </a:p>
-          <a:p>
-            <a:endParaRPr lang="en-NL" dirty="0"/>
-          </a:p>
-        </p:txBody>
-      </p:sp>
-      <p:sp>
-        <p:nvSpPr>
-          <p:cNvPr id="4" name="Slide Number Placeholder 3">
+            <a:pPr algn="ctr"/>
+            <a:r>
+              <a:rPr lang="pt-BR" dirty="0">
+                <a:latin typeface="Avenir Next LT Pro" panose="020B0504020202020204" pitchFamily="34" charset="0"/>
+              </a:rPr>
+              <a:t>Server ABC</a:t>
+            </a:r>
+          </a:p>
+        </p:txBody>
+      </p:sp>
+      <p:sp>
+        <p:nvSpPr>
+          <p:cNvPr id="2" name="Rectangle 1">
             <a:extLst>
               <a:ext uri="{FF2B5EF4-FFF2-40B4-BE49-F238E27FC236}">
-                <a16:creationId xmlns:a16="http://schemas.microsoft.com/office/drawing/2014/main" id="{5D9EE83D-5910-B439-D9AD-37DE50F97B97}"/>
+                <a16:creationId xmlns:a16="http://schemas.microsoft.com/office/drawing/2014/main" id="{917F88EB-6919-752C-67AB-01FDA0AABDFB}"/>
               </a:ext>
             </a:extLst>
           </p:cNvPr>
-          <p:cNvSpPr>
-            <a:spLocks noGrp="1"/>
-          </p:cNvSpPr>
-          <p:nvPr>
-            <p:ph type="sldNum" sz="quarter" idx="4"/>
-          </p:nvPr>
-        </p:nvSpPr>
-        <p:spPr/>
-        <p:txBody>
-          <a:bodyPr/>
+          <p:cNvSpPr/>
+          <p:nvPr/>
+        </p:nvSpPr>
+        <p:spPr>
+          <a:xfrm>
+            <a:off x="1149016" y="2504221"/>
+            <a:ext cx="6196263" cy="3121572"/>
+          </a:xfrm>
+          <a:prstGeom prst="rect">
+            <a:avLst/>
+          </a:prstGeom>
+          <a:solidFill>
+            <a:schemeClr val="accent2"/>
+          </a:solidFill>
+          <a:ln>
+            <a:noFill/>
+          </a:ln>
+        </p:spPr>
+        <p:style>
+          <a:lnRef idx="0">
+            <a:scrgbClr r="0" g="0" b="0"/>
+          </a:lnRef>
+          <a:fillRef idx="0">
+            <a:scrgbClr r="0" g="0" b="0"/>
+          </a:fillRef>
+          <a:effectRef idx="0">
+            <a:scrgbClr r="0" g="0" b="0"/>
+          </a:effectRef>
+          <a:fontRef idx="minor">
+            <a:schemeClr val="lt1"/>
+          </a:fontRef>
+        </p:style>
+        <p:txBody>
+          <a:bodyPr rtlCol="0" anchor="ctr"/>
           <a:lstStyle/>
           <a:p>
-            <a:fld id="{937E74B9-F793-1749-8FE6-1D741809000E}" type="slidenum">
-              <a:rPr lang="en-US" smtClean="0"/>
-              <a:pPr/>
-              <a:t>2</a:t>
-            </a:fld>
-            <a:endParaRPr lang="en-US" dirty="0"/>
-          </a:p>
-        </p:txBody>
-      </p:sp>
+            <a:pPr algn="ctr"/>
+            <a:endParaRPr lang="en-NL" sz="1400"/>
+          </a:p>
+        </p:txBody>
+      </p:sp>
+      <p:sp>
+        <p:nvSpPr>
+          <p:cNvPr id="3" name="Rectangle 2">
+            <a:extLst>
+              <a:ext uri="{FF2B5EF4-FFF2-40B4-BE49-F238E27FC236}">
+                <a16:creationId xmlns:a16="http://schemas.microsoft.com/office/drawing/2014/main" id="{9F11AAE9-9BD4-A9DA-9BCB-D2BD00E03FF5}"/>
+              </a:ext>
+            </a:extLst>
+          </p:cNvPr>
+          <p:cNvSpPr/>
+          <p:nvPr/>
+        </p:nvSpPr>
+        <p:spPr>
+          <a:xfrm>
+            <a:off x="1623766" y="3299661"/>
+            <a:ext cx="1577603" cy="2063442"/>
+          </a:xfrm>
+          <a:prstGeom prst="rect">
+            <a:avLst/>
+          </a:prstGeom>
+          <a:solidFill>
+            <a:schemeClr val="tx2"/>
+          </a:solidFill>
+          <a:ln>
+            <a:noFill/>
+          </a:ln>
+        </p:spPr>
+        <p:style>
+          <a:lnRef idx="2">
+            <a:schemeClr val="accent1">
+              <a:shade val="15000"/>
+            </a:schemeClr>
+          </a:lnRef>
+          <a:fillRef idx="1">
+            <a:schemeClr val="accent1"/>
+          </a:fillRef>
+          <a:effectRef idx="0">
+            <a:schemeClr val="accent1"/>
+          </a:effectRef>
+          <a:fontRef idx="minor">
+            <a:schemeClr val="lt1"/>
+          </a:fontRef>
+        </p:style>
+        <p:txBody>
+          <a:bodyPr rtlCol="0" anchor="ctr"/>
+          <a:lstStyle/>
+          <a:p>
+            <a:pPr algn="ctr"/>
+            <a:r>
+              <a:rPr lang="pt-BR" dirty="0">
+                <a:latin typeface="Avenir Next LT Pro" panose="020B0504020202020204" pitchFamily="34" charset="0"/>
+              </a:rPr>
+              <a:t>AIMMS Application Data Structures </a:t>
+            </a:r>
+            <a:r>
+              <a:rPr lang="pt-BR" sz="1400" dirty="0">
+                <a:latin typeface="Avenir Next LT Pro" panose="020B0504020202020204" pitchFamily="34" charset="0"/>
+              </a:rPr>
+              <a:t>(algebraic notation)</a:t>
+            </a:r>
+            <a:endParaRPr lang="en-NL" dirty="0">
+              <a:latin typeface="Avenir Next LT Pro" panose="020B0504020202020204" pitchFamily="34" charset="0"/>
+            </a:endParaRPr>
+          </a:p>
+        </p:txBody>
+      </p:sp>
+      <p:sp>
+        <p:nvSpPr>
+          <p:cNvPr id="6" name="Rectangle 5">
+            <a:extLst>
+              <a:ext uri="{FF2B5EF4-FFF2-40B4-BE49-F238E27FC236}">
+                <a16:creationId xmlns:a16="http://schemas.microsoft.com/office/drawing/2014/main" id="{FCDB81BF-9D3D-61E7-55A1-447E817955D2}"/>
+              </a:ext>
+            </a:extLst>
+          </p:cNvPr>
+          <p:cNvSpPr/>
+          <p:nvPr/>
+        </p:nvSpPr>
+        <p:spPr>
+          <a:xfrm>
+            <a:off x="5209467" y="3299661"/>
+            <a:ext cx="1577603" cy="2063442"/>
+          </a:xfrm>
+          <a:prstGeom prst="rect">
+            <a:avLst/>
+          </a:prstGeom>
+          <a:solidFill>
+            <a:schemeClr val="accent1"/>
+          </a:solidFill>
+          <a:ln>
+            <a:noFill/>
+          </a:ln>
+        </p:spPr>
+        <p:style>
+          <a:lnRef idx="0">
+            <a:scrgbClr r="0" g="0" b="0"/>
+          </a:lnRef>
+          <a:fillRef idx="0">
+            <a:scrgbClr r="0" g="0" b="0"/>
+          </a:fillRef>
+          <a:effectRef idx="0">
+            <a:scrgbClr r="0" g="0" b="0"/>
+          </a:effectRef>
+          <a:fontRef idx="minor">
+            <a:schemeClr val="lt1"/>
+          </a:fontRef>
+        </p:style>
+        <p:txBody>
+          <a:bodyPr rtlCol="0" anchor="ctr"/>
+          <a:lstStyle/>
+          <a:p>
+            <a:pPr algn="ctr"/>
+            <a:r>
+              <a:rPr lang="pt-BR" dirty="0">
+                <a:latin typeface="Avenir Next LT Pro" panose="020B0504020202020204" pitchFamily="34" charset="0"/>
+              </a:rPr>
+              <a:t>OpenAPI</a:t>
+            </a:r>
+          </a:p>
+          <a:p>
+            <a:pPr algn="ctr"/>
+            <a:endParaRPr lang="pt-BR" dirty="0">
+              <a:latin typeface="Avenir Next LT Pro" panose="020B0504020202020204" pitchFamily="34" charset="0"/>
+            </a:endParaRPr>
+          </a:p>
+          <a:p>
+            <a:pPr algn="ctr"/>
+            <a:r>
+              <a:rPr lang="pt-BR" dirty="0">
+                <a:latin typeface="Avenir Next LT Pro" panose="020B0504020202020204" pitchFamily="34" charset="0"/>
+              </a:rPr>
+              <a:t>Server ABC</a:t>
+            </a:r>
+          </a:p>
+          <a:p>
+            <a:pPr algn="ctr"/>
+            <a:endParaRPr lang="pt-BR" dirty="0">
+              <a:latin typeface="Avenir Next LT Pro" panose="020B0504020202020204" pitchFamily="34" charset="0"/>
+            </a:endParaRPr>
+          </a:p>
+          <a:p>
+            <a:pPr algn="ctr"/>
+            <a:r>
+              <a:rPr lang="pt-BR" dirty="0">
+                <a:latin typeface="Avenir Next LT Pro" panose="020B0504020202020204" pitchFamily="34" charset="0"/>
+              </a:rPr>
+              <a:t>Generated AIMMS Library</a:t>
+            </a:r>
+            <a:endParaRPr lang="en-NL" dirty="0">
+              <a:latin typeface="Avenir Next LT Pro" panose="020B0504020202020204" pitchFamily="34" charset="0"/>
+            </a:endParaRPr>
+          </a:p>
+        </p:txBody>
+      </p:sp>
+      <p:sp>
+        <p:nvSpPr>
+          <p:cNvPr id="7" name="TextBox 6">
+            <a:extLst>
+              <a:ext uri="{FF2B5EF4-FFF2-40B4-BE49-F238E27FC236}">
+                <a16:creationId xmlns:a16="http://schemas.microsoft.com/office/drawing/2014/main" id="{7F29BF55-586F-A0AB-571A-AC1DABE267B0}"/>
+              </a:ext>
+            </a:extLst>
+          </p:cNvPr>
+          <p:cNvSpPr txBox="1"/>
+          <p:nvPr/>
+        </p:nvSpPr>
+        <p:spPr>
+          <a:xfrm>
+            <a:off x="1225216" y="2587792"/>
+            <a:ext cx="2724150" cy="525379"/>
+          </a:xfrm>
+          <a:prstGeom prst="rect">
+            <a:avLst/>
+          </a:prstGeom>
+        </p:spPr>
+        <p:txBody>
+          <a:bodyPr vert="horz" wrap="none" lIns="91440" tIns="45720" rIns="91440" bIns="45720" rtlCol="0" anchor="t">
+            <a:noAutofit/>
+          </a:bodyPr>
+          <a:lstStyle/>
+          <a:p>
+            <a:r>
+              <a:rPr lang="pt-BR" sz="2000" cap="none" baseline="0" dirty="0">
+                <a:solidFill>
+                  <a:schemeClr val="bg1"/>
+                </a:solidFill>
+                <a:latin typeface="Avenir Next LT Pro" panose="020B0504020202020204" pitchFamily="34" charset="0"/>
+              </a:rPr>
+              <a:t>AIMMS Client App</a:t>
+            </a:r>
+            <a:endParaRPr lang="en-NL" sz="2000" cap="none" baseline="0" dirty="0">
+              <a:solidFill>
+                <a:schemeClr val="bg1"/>
+              </a:solidFill>
+              <a:latin typeface="Avenir Next LT Pro" panose="020B0504020202020204" pitchFamily="34" charset="0"/>
+            </a:endParaRPr>
+          </a:p>
+        </p:txBody>
+      </p:sp>
+      <p:sp>
+        <p:nvSpPr>
+          <p:cNvPr id="9" name="Arrow: Right 8">
+            <a:extLst>
+              <a:ext uri="{FF2B5EF4-FFF2-40B4-BE49-F238E27FC236}">
+                <a16:creationId xmlns:a16="http://schemas.microsoft.com/office/drawing/2014/main" id="{022D550D-CCEF-3CB9-2D59-505D40B20F8D}"/>
+              </a:ext>
+            </a:extLst>
+          </p:cNvPr>
+          <p:cNvSpPr/>
+          <p:nvPr/>
+        </p:nvSpPr>
+        <p:spPr>
+          <a:xfrm flipH="1">
+            <a:off x="3270133" y="4914900"/>
+            <a:ext cx="1870570" cy="314325"/>
+          </a:xfrm>
+          <a:prstGeom prst="rightArrow">
+            <a:avLst/>
+          </a:prstGeom>
+          <a:solidFill>
+            <a:schemeClr val="accent6"/>
+          </a:solidFill>
+          <a:ln>
+            <a:noFill/>
+          </a:ln>
+        </p:spPr>
+        <p:style>
+          <a:lnRef idx="0">
+            <a:scrgbClr r="0" g="0" b="0"/>
+          </a:lnRef>
+          <a:fillRef idx="0">
+            <a:scrgbClr r="0" g="0" b="0"/>
+          </a:fillRef>
+          <a:effectRef idx="0">
+            <a:scrgbClr r="0" g="0" b="0"/>
+          </a:effectRef>
+          <a:fontRef idx="minor">
+            <a:schemeClr val="lt1"/>
+          </a:fontRef>
+        </p:style>
+        <p:txBody>
+          <a:bodyPr rtlCol="0" anchor="ctr"/>
+          <a:lstStyle/>
+          <a:p>
+            <a:pPr algn="ctr"/>
+            <a:endParaRPr lang="en-NL"/>
+          </a:p>
+        </p:txBody>
+      </p:sp>
+      <p:sp>
+        <p:nvSpPr>
+          <p:cNvPr id="10" name="Arrow: Right 9">
+            <a:extLst>
+              <a:ext uri="{FF2B5EF4-FFF2-40B4-BE49-F238E27FC236}">
+                <a16:creationId xmlns:a16="http://schemas.microsoft.com/office/drawing/2014/main" id="{F8B91E8E-37E9-0529-A5EC-C210699EC8F3}"/>
+              </a:ext>
+            </a:extLst>
+          </p:cNvPr>
+          <p:cNvSpPr/>
+          <p:nvPr/>
+        </p:nvSpPr>
+        <p:spPr>
+          <a:xfrm flipH="1">
+            <a:off x="6924598" y="4933796"/>
+            <a:ext cx="1870570" cy="314325"/>
+          </a:xfrm>
+          <a:prstGeom prst="rightArrow">
+            <a:avLst/>
+          </a:prstGeom>
+          <a:solidFill>
+            <a:schemeClr val="accent6"/>
+          </a:solidFill>
+          <a:ln>
+            <a:noFill/>
+          </a:ln>
+        </p:spPr>
+        <p:style>
+          <a:lnRef idx="0">
+            <a:scrgbClr r="0" g="0" b="0"/>
+          </a:lnRef>
+          <a:fillRef idx="0">
+            <a:scrgbClr r="0" g="0" b="0"/>
+          </a:fillRef>
+          <a:effectRef idx="0">
+            <a:scrgbClr r="0" g="0" b="0"/>
+          </a:effectRef>
+          <a:fontRef idx="minor">
+            <a:schemeClr val="lt1"/>
+          </a:fontRef>
+        </p:style>
+        <p:txBody>
+          <a:bodyPr rtlCol="0" anchor="ctr"/>
+          <a:lstStyle/>
+          <a:p>
+            <a:pPr algn="ctr"/>
+            <a:endParaRPr lang="en-NL"/>
+          </a:p>
+        </p:txBody>
+      </p:sp>
+      <p:sp>
+        <p:nvSpPr>
+          <p:cNvPr id="13" name="Arrow: Right 12">
+            <a:extLst>
+              <a:ext uri="{FF2B5EF4-FFF2-40B4-BE49-F238E27FC236}">
+                <a16:creationId xmlns:a16="http://schemas.microsoft.com/office/drawing/2014/main" id="{24995AAA-F744-9034-4E4B-69E47F02F777}"/>
+              </a:ext>
+            </a:extLst>
+          </p:cNvPr>
+          <p:cNvSpPr/>
+          <p:nvPr/>
+        </p:nvSpPr>
+        <p:spPr>
+          <a:xfrm>
+            <a:off x="3264769" y="3728935"/>
+            <a:ext cx="1870570" cy="314325"/>
+          </a:xfrm>
+          <a:prstGeom prst="rightArrow">
+            <a:avLst/>
+          </a:prstGeom>
+          <a:solidFill>
+            <a:schemeClr val="accent6"/>
+          </a:solidFill>
+          <a:ln>
+            <a:noFill/>
+          </a:ln>
+        </p:spPr>
+        <p:style>
+          <a:lnRef idx="0">
+            <a:scrgbClr r="0" g="0" b="0"/>
+          </a:lnRef>
+          <a:fillRef idx="0">
+            <a:scrgbClr r="0" g="0" b="0"/>
+          </a:fillRef>
+          <a:effectRef idx="0">
+            <a:scrgbClr r="0" g="0" b="0"/>
+          </a:effectRef>
+          <a:fontRef idx="minor">
+            <a:schemeClr val="lt1"/>
+          </a:fontRef>
+        </p:style>
+        <p:txBody>
+          <a:bodyPr rtlCol="0" anchor="ctr"/>
+          <a:lstStyle/>
+          <a:p>
+            <a:pPr algn="ctr"/>
+            <a:endParaRPr lang="en-NL"/>
+          </a:p>
+        </p:txBody>
+      </p:sp>
+      <p:sp>
+        <p:nvSpPr>
+          <p:cNvPr id="14" name="Arrow: Right 13">
+            <a:extLst>
+              <a:ext uri="{FF2B5EF4-FFF2-40B4-BE49-F238E27FC236}">
+                <a16:creationId xmlns:a16="http://schemas.microsoft.com/office/drawing/2014/main" id="{CCAC54D7-1656-0534-2FA7-1D769BEB3DBA}"/>
+              </a:ext>
+            </a:extLst>
+          </p:cNvPr>
+          <p:cNvSpPr/>
+          <p:nvPr/>
+        </p:nvSpPr>
+        <p:spPr>
+          <a:xfrm>
+            <a:off x="6924598" y="3726390"/>
+            <a:ext cx="1870570" cy="314325"/>
+          </a:xfrm>
+          <a:prstGeom prst="rightArrow">
+            <a:avLst/>
+          </a:prstGeom>
+          <a:solidFill>
+            <a:schemeClr val="accent6"/>
+          </a:solidFill>
+          <a:ln>
+            <a:noFill/>
+          </a:ln>
+        </p:spPr>
+        <p:style>
+          <a:lnRef idx="0">
+            <a:scrgbClr r="0" g="0" b="0"/>
+          </a:lnRef>
+          <a:fillRef idx="0">
+            <a:scrgbClr r="0" g="0" b="0"/>
+          </a:fillRef>
+          <a:effectRef idx="0">
+            <a:scrgbClr r="0" g="0" b="0"/>
+          </a:effectRef>
+          <a:fontRef idx="minor">
+            <a:schemeClr val="lt1"/>
+          </a:fontRef>
+        </p:style>
+        <p:txBody>
+          <a:bodyPr rtlCol="0" anchor="ctr"/>
+          <a:lstStyle/>
+          <a:p>
+            <a:pPr algn="ctr"/>
+            <a:endParaRPr lang="en-NL"/>
+          </a:p>
+        </p:txBody>
+      </p:sp>
+      <p:sp>
+        <p:nvSpPr>
+          <p:cNvPr id="15" name="TextBox 14">
+            <a:extLst>
+              <a:ext uri="{FF2B5EF4-FFF2-40B4-BE49-F238E27FC236}">
+                <a16:creationId xmlns:a16="http://schemas.microsoft.com/office/drawing/2014/main" id="{F73D7C21-78BA-192E-386F-B93437D03006}"/>
+              </a:ext>
+            </a:extLst>
+          </p:cNvPr>
+          <p:cNvSpPr txBox="1"/>
+          <p:nvPr/>
+        </p:nvSpPr>
+        <p:spPr>
+          <a:xfrm>
+            <a:off x="7164208" y="3335764"/>
+            <a:ext cx="1311642" cy="393171"/>
+          </a:xfrm>
+          <a:prstGeom prst="rect">
+            <a:avLst/>
+          </a:prstGeom>
+          <a:solidFill>
+            <a:srgbClr val="575757"/>
+          </a:solidFill>
+        </p:spPr>
+        <p:txBody>
+          <a:bodyPr vert="horz" wrap="none" lIns="91440" tIns="45720" rIns="91440" bIns="45720" rtlCol="0" anchor="ctr">
+            <a:noAutofit/>
+          </a:bodyPr>
+          <a:lstStyle/>
+          <a:p>
+            <a:pPr algn="ctr"/>
+            <a:r>
+              <a:rPr lang="pt-BR" sz="1050" cap="none" baseline="0" dirty="0">
+                <a:solidFill>
+                  <a:schemeClr val="bg1"/>
+                </a:solidFill>
+                <a:latin typeface="Avenir Next LT Pro" panose="020B0504020202020204" pitchFamily="34" charset="0"/>
+              </a:rPr>
+              <a:t>2 - Request Data </a:t>
+            </a:r>
+          </a:p>
+          <a:p>
+            <a:pPr algn="ctr"/>
+            <a:r>
+              <a:rPr lang="pt-BR" sz="1050" cap="none" baseline="0" dirty="0">
+                <a:solidFill>
+                  <a:schemeClr val="bg1"/>
+                </a:solidFill>
+                <a:latin typeface="Avenir Next LT Pro" panose="020B0504020202020204" pitchFamily="34" charset="0"/>
+              </a:rPr>
+              <a:t>(Server Format)</a:t>
+            </a:r>
+            <a:endParaRPr lang="en-NL" sz="1050" cap="none" baseline="0" dirty="0">
+              <a:solidFill>
+                <a:schemeClr val="bg1"/>
+              </a:solidFill>
+              <a:latin typeface="Avenir Next LT Pro" panose="020B0504020202020204" pitchFamily="34" charset="0"/>
+            </a:endParaRPr>
+          </a:p>
+        </p:txBody>
+      </p:sp>
+      <p:sp>
+        <p:nvSpPr>
+          <p:cNvPr id="16" name="TextBox 15">
+            <a:extLst>
+              <a:ext uri="{FF2B5EF4-FFF2-40B4-BE49-F238E27FC236}">
+                <a16:creationId xmlns:a16="http://schemas.microsoft.com/office/drawing/2014/main" id="{B1A9F5D7-0C98-9BAD-048F-6B359F2552AF}"/>
+              </a:ext>
+            </a:extLst>
+          </p:cNvPr>
+          <p:cNvSpPr txBox="1"/>
+          <p:nvPr/>
+        </p:nvSpPr>
+        <p:spPr>
+          <a:xfrm>
+            <a:off x="7164208" y="4540625"/>
+            <a:ext cx="1311642" cy="393171"/>
+          </a:xfrm>
+          <a:prstGeom prst="rect">
+            <a:avLst/>
+          </a:prstGeom>
+          <a:solidFill>
+            <a:srgbClr val="575757"/>
+          </a:solidFill>
+        </p:spPr>
+        <p:txBody>
+          <a:bodyPr vert="horz" wrap="none" lIns="91440" tIns="45720" rIns="91440" bIns="45720" rtlCol="0" anchor="ctr">
+            <a:noAutofit/>
+          </a:bodyPr>
+          <a:lstStyle/>
+          <a:p>
+            <a:pPr algn="ctr"/>
+            <a:r>
+              <a:rPr lang="pt-BR" sz="1050" cap="none" baseline="0" dirty="0">
+                <a:solidFill>
+                  <a:schemeClr val="bg1"/>
+                </a:solidFill>
+                <a:latin typeface="Avenir Next LT Pro" panose="020B0504020202020204" pitchFamily="34" charset="0"/>
+              </a:rPr>
+              <a:t>3 - Response Data </a:t>
+            </a:r>
+          </a:p>
+          <a:p>
+            <a:pPr algn="ctr"/>
+            <a:r>
+              <a:rPr lang="pt-BR" sz="1050" cap="none" baseline="0" dirty="0">
+                <a:solidFill>
+                  <a:schemeClr val="bg1"/>
+                </a:solidFill>
+                <a:latin typeface="Avenir Next LT Pro" panose="020B0504020202020204" pitchFamily="34" charset="0"/>
+              </a:rPr>
+              <a:t>(Server Format)</a:t>
+            </a:r>
+            <a:endParaRPr lang="en-NL" sz="1050" cap="none" baseline="0" dirty="0">
+              <a:solidFill>
+                <a:schemeClr val="bg1"/>
+              </a:solidFill>
+              <a:latin typeface="Avenir Next LT Pro" panose="020B0504020202020204" pitchFamily="34" charset="0"/>
+            </a:endParaRPr>
+          </a:p>
+        </p:txBody>
+      </p:sp>
+      <p:sp>
+        <p:nvSpPr>
+          <p:cNvPr id="17" name="TextBox 16">
+            <a:extLst>
+              <a:ext uri="{FF2B5EF4-FFF2-40B4-BE49-F238E27FC236}">
+                <a16:creationId xmlns:a16="http://schemas.microsoft.com/office/drawing/2014/main" id="{B66F3DE5-205B-535C-1540-6CA9856614A9}"/>
+              </a:ext>
+            </a:extLst>
+          </p:cNvPr>
+          <p:cNvSpPr txBox="1"/>
+          <p:nvPr/>
+        </p:nvSpPr>
+        <p:spPr>
+          <a:xfrm>
+            <a:off x="3477144" y="3335764"/>
+            <a:ext cx="1311642" cy="393171"/>
+          </a:xfrm>
+          <a:prstGeom prst="rect">
+            <a:avLst/>
+          </a:prstGeom>
+          <a:solidFill>
+            <a:srgbClr val="575757"/>
+          </a:solidFill>
+        </p:spPr>
+        <p:txBody>
+          <a:bodyPr vert="horz" wrap="none" lIns="91440" tIns="45720" rIns="91440" bIns="45720" rtlCol="0" anchor="ctr">
+            <a:noAutofit/>
+          </a:bodyPr>
+          <a:lstStyle/>
+          <a:p>
+            <a:pPr algn="ctr"/>
+            <a:r>
+              <a:rPr lang="pt-BR" sz="1050" cap="none" baseline="0" dirty="0">
+                <a:solidFill>
+                  <a:schemeClr val="bg1"/>
+                </a:solidFill>
+                <a:latin typeface="Avenir Next LT Pro" panose="020B0504020202020204" pitchFamily="34" charset="0"/>
+              </a:rPr>
+              <a:t>1 - Request Data </a:t>
+            </a:r>
+          </a:p>
+          <a:p>
+            <a:pPr algn="ctr"/>
+            <a:r>
+              <a:rPr lang="pt-BR" sz="1050" cap="none" baseline="0" dirty="0">
+                <a:solidFill>
+                  <a:schemeClr val="bg1"/>
+                </a:solidFill>
+                <a:latin typeface="Avenir Next LT Pro" panose="020B0504020202020204" pitchFamily="34" charset="0"/>
+              </a:rPr>
+              <a:t>(AIMMS Format)</a:t>
+            </a:r>
+            <a:endParaRPr lang="en-NL" sz="1050" cap="none" baseline="0" dirty="0">
+              <a:solidFill>
+                <a:schemeClr val="bg1"/>
+              </a:solidFill>
+              <a:latin typeface="Avenir Next LT Pro" panose="020B0504020202020204" pitchFamily="34" charset="0"/>
+            </a:endParaRPr>
+          </a:p>
+        </p:txBody>
+      </p:sp>
+      <p:sp>
+        <p:nvSpPr>
+          <p:cNvPr id="18" name="TextBox 17">
+            <a:extLst>
+              <a:ext uri="{FF2B5EF4-FFF2-40B4-BE49-F238E27FC236}">
+                <a16:creationId xmlns:a16="http://schemas.microsoft.com/office/drawing/2014/main" id="{A428C5BA-62E8-265B-E316-884DA77EB44F}"/>
+              </a:ext>
+            </a:extLst>
+          </p:cNvPr>
+          <p:cNvSpPr txBox="1"/>
+          <p:nvPr/>
+        </p:nvSpPr>
+        <p:spPr>
+          <a:xfrm>
+            <a:off x="3477144" y="4540625"/>
+            <a:ext cx="1311642" cy="393171"/>
+          </a:xfrm>
+          <a:prstGeom prst="rect">
+            <a:avLst/>
+          </a:prstGeom>
+          <a:solidFill>
+            <a:srgbClr val="575757"/>
+          </a:solidFill>
+        </p:spPr>
+        <p:txBody>
+          <a:bodyPr vert="horz" wrap="none" lIns="91440" tIns="45720" rIns="91440" bIns="45720" rtlCol="0" anchor="ctr">
+            <a:noAutofit/>
+          </a:bodyPr>
+          <a:lstStyle/>
+          <a:p>
+            <a:pPr algn="ctr"/>
+            <a:r>
+              <a:rPr lang="pt-BR" sz="1050" cap="none" baseline="0" dirty="0">
+                <a:solidFill>
+                  <a:schemeClr val="bg1"/>
+                </a:solidFill>
+                <a:latin typeface="Avenir Next LT Pro" panose="020B0504020202020204" pitchFamily="34" charset="0"/>
+              </a:rPr>
+              <a:t>4 - Response Data </a:t>
+            </a:r>
+          </a:p>
+          <a:p>
+            <a:pPr algn="ctr"/>
+            <a:r>
+              <a:rPr lang="pt-BR" sz="1050" cap="none" baseline="0" dirty="0">
+                <a:solidFill>
+                  <a:schemeClr val="bg1"/>
+                </a:solidFill>
+                <a:latin typeface="Avenir Next LT Pro" panose="020B0504020202020204" pitchFamily="34" charset="0"/>
+              </a:rPr>
+              <a:t>(AIMMS Format)</a:t>
+            </a:r>
+            <a:endParaRPr lang="en-NL" sz="1050" cap="none" baseline="0" dirty="0">
+              <a:solidFill>
+                <a:schemeClr val="bg1"/>
+              </a:solidFill>
+              <a:latin typeface="Avenir Next LT Pro" panose="020B0504020202020204" pitchFamily="34" charset="0"/>
+            </a:endParaRPr>
+          </a:p>
+        </p:txBody>
+      </p:sp>
+      <p:pic>
+        <p:nvPicPr>
+          <p:cNvPr id="19" name="Picture 18">
+            <a:extLst>
+              <a:ext uri="{FF2B5EF4-FFF2-40B4-BE49-F238E27FC236}">
+                <a16:creationId xmlns:a16="http://schemas.microsoft.com/office/drawing/2014/main" id="{10B3F769-322C-B0F5-0671-A0C617E3CCE0}"/>
+              </a:ext>
+            </a:extLst>
+          </p:cNvPr>
+          <p:cNvPicPr>
+            <a:picLocks noChangeAspect="1"/>
+          </p:cNvPicPr>
+          <p:nvPr/>
+        </p:nvPicPr>
+        <p:blipFill>
+          <a:blip r:embed="rId3"/>
+          <a:stretch>
+            <a:fillRect/>
+          </a:stretch>
+        </p:blipFill>
+        <p:spPr>
+          <a:xfrm>
+            <a:off x="926281" y="3988881"/>
+            <a:ext cx="9364268" cy="3121423"/>
+          </a:xfrm>
+          <a:prstGeom prst="rect">
+            <a:avLst/>
+          </a:prstGeom>
+        </p:spPr>
+      </p:pic>
     </p:spTree>
     <p:extLst>
       <p:ext uri="{BB962C8B-B14F-4D97-AF65-F5344CB8AC3E}">
-        <p14:creationId xmlns:p14="http://schemas.microsoft.com/office/powerpoint/2010/main" val="474741936"/>
+        <p14:creationId xmlns:p14="http://schemas.microsoft.com/office/powerpoint/2010/main" val="681598326"/>
       </p:ext>
     </p:extLst>
   </p:cSld>
@@ -4528,7 +5408,7 @@
           <p:cNvPr id="2" name="Title 1">
             <a:extLst>
               <a:ext uri="{FF2B5EF4-FFF2-40B4-BE49-F238E27FC236}">
-                <a16:creationId xmlns:a16="http://schemas.microsoft.com/office/drawing/2014/main" id="{0A801B40-F57D-FDE7-F96B-D8380144C89C}"/>
+                <a16:creationId xmlns:a16="http://schemas.microsoft.com/office/drawing/2014/main" id="{6E57F283-E630-AC37-024F-A59E6C87B4D8}"/>
               </a:ext>
             </a:extLst>
           </p:cNvPr>
@@ -4546,7 +5426,7 @@
           <a:p>
             <a:r>
               <a:rPr lang="en-GB" dirty="0"/>
-              <a:t>AIMMS WebUI App</a:t>
+              <a:t>Python App</a:t>
             </a:r>
             <a:endParaRPr lang="en-NL" dirty="0"/>
           </a:p>
@@ -4557,7 +5437,7 @@
           <p:cNvPr id="3" name="Content Placeholder 2">
             <a:extLst>
               <a:ext uri="{FF2B5EF4-FFF2-40B4-BE49-F238E27FC236}">
-                <a16:creationId xmlns:a16="http://schemas.microsoft.com/office/drawing/2014/main" id="{3808F261-73CA-AFD8-C72A-B366FF6DA557}"/>
+                <a16:creationId xmlns:a16="http://schemas.microsoft.com/office/drawing/2014/main" id="{63116121-158E-B5B1-75CF-C9736A15DB6E}"/>
               </a:ext>
             </a:extLst>
           </p:cNvPr>
@@ -4574,52 +5454,90 @@
           <a:lstStyle/>
           <a:p>
             <a:r>
+              <a:rPr lang="en-GB" dirty="0" err="1"/>
+              <a:t>Pydantic</a:t>
+            </a:r>
+            <a:endParaRPr lang="en-GB" dirty="0"/>
+          </a:p>
+          <a:p>
+            <a:pPr lvl="1"/>
+            <a:r>
+              <a:rPr lang="en-GB" dirty="0" err="1"/>
+              <a:t>Modeling</a:t>
+            </a:r>
+            <a:r>
               <a:rPr lang="en-GB" dirty="0"/>
-              <a:t>Step 1: </a:t>
-            </a:r>
+              <a:t> of classes used in interface</a:t>
+            </a:r>
+          </a:p>
+          <a:p>
+            <a:r>
+              <a:rPr lang="en-GB" dirty="0" err="1"/>
+              <a:t>FastAPI</a:t>
+            </a:r>
+            <a:endParaRPr lang="en-GB" dirty="0"/>
+          </a:p>
+          <a:p>
+            <a:pPr lvl="1"/>
+            <a:r>
+              <a:rPr lang="en-GB" dirty="0"/>
+              <a:t>Construct </a:t>
+            </a:r>
+            <a:r>
+              <a:rPr lang="en-GB" dirty="0" err="1"/>
+              <a:t>RestAPI</a:t>
+            </a:r>
+            <a:endParaRPr lang="en-GB" dirty="0"/>
+          </a:p>
+          <a:p>
+            <a:r>
+              <a:rPr lang="en-GB" dirty="0" err="1"/>
+              <a:t>Uvicorn</a:t>
+            </a:r>
+            <a:endParaRPr lang="en-GB" dirty="0"/>
+          </a:p>
+          <a:p>
+            <a:pPr lvl="1"/>
+            <a:r>
+              <a:rPr lang="en-GB" dirty="0"/>
+              <a:t>Start Service</a:t>
+            </a:r>
+          </a:p>
+          <a:p>
+            <a:r>
+              <a:rPr lang="en-GB" dirty="0"/>
+              <a:t>Essential Extras</a:t>
+            </a:r>
+          </a:p>
+          <a:p>
+            <a:pPr lvl="1"/>
             <a:r>
               <a:rPr lang="en-GB" dirty="0" err="1"/>
               <a:t>OpenAPI</a:t>
             </a:r>
             <a:r>
               <a:rPr lang="en-GB" dirty="0"/>
-              <a:t> library</a:t>
+              <a:t> 3.1 interface spec</a:t>
             </a:r>
           </a:p>
           <a:p>
             <a:pPr lvl="1"/>
             <a:r>
               <a:rPr lang="en-GB" dirty="0"/>
-              <a:t>Generate</a:t>
+              <a:t>Interface Doc</a:t>
             </a:r>
           </a:p>
           <a:p>
             <a:pPr lvl="1"/>
-            <a:r>
-              <a:rPr lang="en-GB" dirty="0"/>
-              <a:t>Add</a:t>
-            </a:r>
-          </a:p>
-          <a:p>
-            <a:r>
-              <a:rPr lang="en-GB" dirty="0"/>
-              <a:t>Step 2: </a:t>
-            </a:r>
-          </a:p>
-          <a:p>
-            <a:pPr lvl="1"/>
-            <a:r>
-              <a:rPr lang="en-GB" dirty="0"/>
-              <a:t>Start using it via </a:t>
-            </a:r>
-            <a:r>
-              <a:rPr lang="en-GB" dirty="0" err="1"/>
-              <a:t>OpenAPI</a:t>
-            </a:r>
-            <a:r>
-              <a:rPr lang="en-GB" dirty="0"/>
-              <a:t> calls.</a:t>
-            </a:r>
+            <a:endParaRPr lang="en-GB" dirty="0"/>
+          </a:p>
+          <a:p>
+            <a:pPr marL="0" indent="0">
+              <a:buNone/>
+            </a:pPr>
+            <a:endParaRPr lang="en-GB" dirty="0"/>
+          </a:p>
+          <a:p>
             <a:endParaRPr lang="en-NL" dirty="0"/>
           </a:p>
         </p:txBody>
@@ -4629,7 +5547,7 @@
           <p:cNvPr id="4" name="Slide Number Placeholder 3">
             <a:extLst>
               <a:ext uri="{FF2B5EF4-FFF2-40B4-BE49-F238E27FC236}">
-                <a16:creationId xmlns:a16="http://schemas.microsoft.com/office/drawing/2014/main" id="{A03F54DD-FB2C-AA68-9BDC-FF1C1F874A3D}"/>
+                <a16:creationId xmlns:a16="http://schemas.microsoft.com/office/drawing/2014/main" id="{5D9EE83D-5910-B439-D9AD-37DE50F97B97}"/>
               </a:ext>
             </a:extLst>
           </p:cNvPr>
@@ -4657,7 +5575,7 @@
     </p:spTree>
     <p:extLst>
       <p:ext uri="{BB962C8B-B14F-4D97-AF65-F5344CB8AC3E}">
-        <p14:creationId xmlns:p14="http://schemas.microsoft.com/office/powerpoint/2010/main" val="3827445563"/>
+        <p14:creationId xmlns:p14="http://schemas.microsoft.com/office/powerpoint/2010/main" val="474741936"/>
       </p:ext>
     </p:extLst>
   </p:cSld>
@@ -4689,7 +5607,7 @@
           <p:cNvPr id="2" name="Title 1">
             <a:extLst>
               <a:ext uri="{FF2B5EF4-FFF2-40B4-BE49-F238E27FC236}">
-                <a16:creationId xmlns:a16="http://schemas.microsoft.com/office/drawing/2014/main" id="{D740C843-9832-A710-BDEA-8952BF17B929}"/>
+                <a16:creationId xmlns:a16="http://schemas.microsoft.com/office/drawing/2014/main" id="{0A801B40-F57D-FDE7-F96B-D8380144C89C}"/>
               </a:ext>
             </a:extLst>
           </p:cNvPr>
@@ -4707,7 +5625,7 @@
           <a:p>
             <a:r>
               <a:rPr lang="en-GB" dirty="0"/>
-              <a:t>Deploy AIMMS App (with Python script included)</a:t>
+              <a:t>AIMMS WebUI App</a:t>
             </a:r>
             <a:endParaRPr lang="en-NL" dirty="0"/>
           </a:p>
@@ -4718,7 +5636,7 @@
           <p:cNvPr id="3" name="Content Placeholder 2">
             <a:extLst>
               <a:ext uri="{FF2B5EF4-FFF2-40B4-BE49-F238E27FC236}">
-                <a16:creationId xmlns:a16="http://schemas.microsoft.com/office/drawing/2014/main" id="{B954C488-AB9F-51F1-920A-0F4C1B4E3677}"/>
+                <a16:creationId xmlns:a16="http://schemas.microsoft.com/office/drawing/2014/main" id="{3808F261-73CA-AFD8-C72A-B366FF6DA557}"/>
               </a:ext>
             </a:extLst>
           </p:cNvPr>
@@ -4736,71 +5654,51 @@
           <a:p>
             <a:r>
               <a:rPr lang="en-GB" dirty="0"/>
-              <a:t>Copy to AIMMS PRO Storage</a:t>
+              <a:t>Step 1: </a:t>
+            </a:r>
+            <a:r>
+              <a:rPr lang="en-GB" dirty="0" err="1"/>
+              <a:t>OpenAPI</a:t>
+            </a:r>
+            <a:r>
+              <a:rPr lang="en-GB" dirty="0"/>
+              <a:t> library</a:t>
             </a:r>
           </a:p>
           <a:p>
             <a:pPr lvl="1"/>
             <a:r>
               <a:rPr lang="en-GB" dirty="0"/>
-              <a:t>Demo app contains copy of Python script</a:t>
+              <a:t>Generate</a:t>
             </a:r>
           </a:p>
           <a:p>
             <a:pPr lvl="1"/>
             <a:r>
               <a:rPr lang="en-GB" dirty="0"/>
-              <a:t>Could be separated</a:t>
+              <a:t>Add</a:t>
             </a:r>
           </a:p>
           <a:p>
             <a:r>
               <a:rPr lang="en-GB" dirty="0"/>
-              <a:t>Start service</a:t>
+              <a:t>Step 2: </a:t>
             </a:r>
           </a:p>
           <a:p>
             <a:pPr lvl="1"/>
             <a:r>
               <a:rPr lang="en-GB" dirty="0"/>
-              <a:t>pro::service::</a:t>
+              <a:t>Start using it via </a:t>
             </a:r>
             <a:r>
               <a:rPr lang="en-GB" dirty="0" err="1"/>
-              <a:t>LaunchService</a:t>
-            </a:r>
-            <a:endParaRPr lang="en-GB" dirty="0"/>
-          </a:p>
-          <a:p>
-            <a:pPr lvl="1"/>
+              <a:t>OpenAPI</a:t>
+            </a:r>
             <a:r>
               <a:rPr lang="en-GB" dirty="0"/>
-              <a:t>.</a:t>
-            </a:r>
-            <a:r>
-              <a:rPr lang="en-GB" dirty="0" err="1"/>
-              <a:t>json</a:t>
-            </a:r>
-            <a:r>
-              <a:rPr lang="en-GB" dirty="0"/>
-              <a:t> file</a:t>
-            </a:r>
-          </a:p>
-          <a:p>
-            <a:r>
-              <a:rPr lang="en-GB" dirty="0"/>
-              <a:t>List of containers available</a:t>
-            </a:r>
-          </a:p>
-          <a:p>
-            <a:pPr lvl="1"/>
-            <a:r>
-              <a:rPr lang="en-GB" dirty="0"/>
-              <a:t>Unknown – currently only </a:t>
-            </a:r>
-          </a:p>
-          <a:p>
-            <a:pPr lvl="1"/>
+              <a:t> calls.</a:t>
+            </a:r>
             <a:endParaRPr lang="en-NL" dirty="0"/>
           </a:p>
         </p:txBody>
@@ -4810,7 +5708,7 @@
           <p:cNvPr id="4" name="Slide Number Placeholder 3">
             <a:extLst>
               <a:ext uri="{FF2B5EF4-FFF2-40B4-BE49-F238E27FC236}">
-                <a16:creationId xmlns:a16="http://schemas.microsoft.com/office/drawing/2014/main" id="{7E62E24B-B4CB-F0B0-F3E3-4E7D5CAF21A6}"/>
+                <a16:creationId xmlns:a16="http://schemas.microsoft.com/office/drawing/2014/main" id="{A03F54DD-FB2C-AA68-9BDC-FF1C1F874A3D}"/>
               </a:ext>
             </a:extLst>
           </p:cNvPr>
@@ -4838,7 +5736,7 @@
     </p:spTree>
     <p:extLst>
       <p:ext uri="{BB962C8B-B14F-4D97-AF65-F5344CB8AC3E}">
-        <p14:creationId xmlns:p14="http://schemas.microsoft.com/office/powerpoint/2010/main" val="1007680773"/>
+        <p14:creationId xmlns:p14="http://schemas.microsoft.com/office/powerpoint/2010/main" val="3827445563"/>
       </p:ext>
     </p:extLst>
   </p:cSld>
@@ -4870,6 +5768,187 @@
           <p:cNvPr id="2" name="Title 1">
             <a:extLst>
               <a:ext uri="{FF2B5EF4-FFF2-40B4-BE49-F238E27FC236}">
+                <a16:creationId xmlns:a16="http://schemas.microsoft.com/office/drawing/2014/main" id="{D740C843-9832-A710-BDEA-8952BF17B929}"/>
+              </a:ext>
+            </a:extLst>
+          </p:cNvPr>
+          <p:cNvSpPr>
+            <a:spLocks noGrp="1"/>
+          </p:cNvSpPr>
+          <p:nvPr>
+            <p:ph type="title"/>
+          </p:nvPr>
+        </p:nvSpPr>
+        <p:spPr/>
+        <p:txBody>
+          <a:bodyPr/>
+          <a:lstStyle/>
+          <a:p>
+            <a:r>
+              <a:rPr lang="en-GB" dirty="0"/>
+              <a:t>Deploy AIMMS App (with Python script included)</a:t>
+            </a:r>
+            <a:endParaRPr lang="en-NL" dirty="0"/>
+          </a:p>
+        </p:txBody>
+      </p:sp>
+      <p:sp>
+        <p:nvSpPr>
+          <p:cNvPr id="3" name="Content Placeholder 2">
+            <a:extLst>
+              <a:ext uri="{FF2B5EF4-FFF2-40B4-BE49-F238E27FC236}">
+                <a16:creationId xmlns:a16="http://schemas.microsoft.com/office/drawing/2014/main" id="{B954C488-AB9F-51F1-920A-0F4C1B4E3677}"/>
+              </a:ext>
+            </a:extLst>
+          </p:cNvPr>
+          <p:cNvSpPr>
+            <a:spLocks noGrp="1"/>
+          </p:cNvSpPr>
+          <p:nvPr>
+            <p:ph idx="1"/>
+          </p:nvPr>
+        </p:nvSpPr>
+        <p:spPr/>
+        <p:txBody>
+          <a:bodyPr/>
+          <a:lstStyle/>
+          <a:p>
+            <a:r>
+              <a:rPr lang="en-GB" dirty="0"/>
+              <a:t>Copy to AIMMS PRO Storage</a:t>
+            </a:r>
+          </a:p>
+          <a:p>
+            <a:pPr lvl="1"/>
+            <a:r>
+              <a:rPr lang="en-GB" dirty="0"/>
+              <a:t>Demo app contains copy of Python script</a:t>
+            </a:r>
+          </a:p>
+          <a:p>
+            <a:pPr lvl="1"/>
+            <a:r>
+              <a:rPr lang="en-GB" dirty="0"/>
+              <a:t>Could be separated</a:t>
+            </a:r>
+          </a:p>
+          <a:p>
+            <a:r>
+              <a:rPr lang="en-GB" dirty="0"/>
+              <a:t>Start service</a:t>
+            </a:r>
+          </a:p>
+          <a:p>
+            <a:pPr lvl="1"/>
+            <a:r>
+              <a:rPr lang="en-GB" dirty="0"/>
+              <a:t>pro::service::</a:t>
+            </a:r>
+            <a:r>
+              <a:rPr lang="en-GB" dirty="0" err="1"/>
+              <a:t>LaunchService</a:t>
+            </a:r>
+            <a:endParaRPr lang="en-GB" dirty="0"/>
+          </a:p>
+          <a:p>
+            <a:pPr lvl="1"/>
+            <a:r>
+              <a:rPr lang="en-GB" dirty="0"/>
+              <a:t>.</a:t>
+            </a:r>
+            <a:r>
+              <a:rPr lang="en-GB" dirty="0" err="1"/>
+              <a:t>json</a:t>
+            </a:r>
+            <a:r>
+              <a:rPr lang="en-GB" dirty="0"/>
+              <a:t> file</a:t>
+            </a:r>
+          </a:p>
+          <a:p>
+            <a:r>
+              <a:rPr lang="en-GB" dirty="0"/>
+              <a:t>List of containers available</a:t>
+            </a:r>
+          </a:p>
+          <a:p>
+            <a:pPr lvl="1"/>
+            <a:r>
+              <a:rPr lang="en-GB" dirty="0"/>
+              <a:t>Unknown – currently only </a:t>
+            </a:r>
+          </a:p>
+          <a:p>
+            <a:pPr lvl="1"/>
+            <a:endParaRPr lang="en-NL" dirty="0"/>
+          </a:p>
+        </p:txBody>
+      </p:sp>
+      <p:sp>
+        <p:nvSpPr>
+          <p:cNvPr id="4" name="Slide Number Placeholder 3">
+            <a:extLst>
+              <a:ext uri="{FF2B5EF4-FFF2-40B4-BE49-F238E27FC236}">
+                <a16:creationId xmlns:a16="http://schemas.microsoft.com/office/drawing/2014/main" id="{7E62E24B-B4CB-F0B0-F3E3-4E7D5CAF21A6}"/>
+              </a:ext>
+            </a:extLst>
+          </p:cNvPr>
+          <p:cNvSpPr>
+            <a:spLocks noGrp="1"/>
+          </p:cNvSpPr>
+          <p:nvPr>
+            <p:ph type="sldNum" sz="quarter" idx="4"/>
+          </p:nvPr>
+        </p:nvSpPr>
+        <p:spPr/>
+        <p:txBody>
+          <a:bodyPr/>
+          <a:lstStyle/>
+          <a:p>
+            <a:fld id="{937E74B9-F793-1749-8FE6-1D741809000E}" type="slidenum">
+              <a:rPr lang="en-US" smtClean="0"/>
+              <a:pPr/>
+              <a:t>5</a:t>
+            </a:fld>
+            <a:endParaRPr lang="en-US" dirty="0"/>
+          </a:p>
+        </p:txBody>
+      </p:sp>
+    </p:spTree>
+    <p:extLst>
+      <p:ext uri="{BB962C8B-B14F-4D97-AF65-F5344CB8AC3E}">
+        <p14:creationId xmlns:p14="http://schemas.microsoft.com/office/powerpoint/2010/main" val="1007680773"/>
+      </p:ext>
+    </p:extLst>
+  </p:cSld>
+  <p:clrMapOvr>
+    <a:masterClrMapping/>
+  </p:clrMapOvr>
+</p:sld>
+</file>
+
+<file path=ppt/slides/slide6.xml><?xml version="1.0" encoding="utf-8"?>
+<p:sld xmlns:a="http://schemas.openxmlformats.org/drawingml/2006/main" xmlns:r="http://schemas.openxmlformats.org/officeDocument/2006/relationships" xmlns:p="http://schemas.openxmlformats.org/presentationml/2006/main">
+  <p:cSld>
+    <p:spTree>
+      <p:nvGrpSpPr>
+        <p:cNvPr id="1" name=""/>
+        <p:cNvGrpSpPr/>
+        <p:nvPr/>
+      </p:nvGrpSpPr>
+      <p:grpSpPr>
+        <a:xfrm>
+          <a:off x="0" y="0"/>
+          <a:ext cx="0" cy="0"/>
+          <a:chOff x="0" y="0"/>
+          <a:chExt cx="0" cy="0"/>
+        </a:xfrm>
+      </p:grpSpPr>
+      <p:sp>
+        <p:nvSpPr>
+          <p:cNvPr id="2" name="Title 1">
+            <a:extLst>
+              <a:ext uri="{FF2B5EF4-FFF2-40B4-BE49-F238E27FC236}">
                 <a16:creationId xmlns:a16="http://schemas.microsoft.com/office/drawing/2014/main" id="{640A5AC3-A441-A0CB-C87F-FB78E480AA2F}"/>
               </a:ext>
             </a:extLst>
@@ -5009,7 +6088,7 @@
             <a:fld id="{937E74B9-F793-1749-8FE6-1D741809000E}" type="slidenum">
               <a:rPr lang="en-US" smtClean="0"/>
               <a:pPr/>
-              <a:t>5</a:t>
+              <a:t>6</a:t>
             </a:fld>
             <a:endParaRPr lang="en-US" dirty="0"/>
           </a:p>
@@ -6011,21 +7090,6 @@
 </file>
 
 <file path=customXml/item1.xml><?xml version="1.0" encoding="utf-8"?>
-<?mso-contentType ?>
-<FormTemplates xmlns="http://schemas.microsoft.com/sharepoint/v3/contenttype/forms">
-  <Display>DocumentLibraryForm</Display>
-  <Edit>DocumentLibraryForm</Edit>
-  <New>DocumentLibraryForm</New>
-</FormTemplates>
-</file>
-
-<file path=customXml/item2.xml><?xml version="1.0" encoding="utf-8"?>
-<p:properties xmlns:p="http://schemas.microsoft.com/office/2006/metadata/properties" xmlns:xsi="http://www.w3.org/2001/XMLSchema-instance" xmlns:pc="http://schemas.microsoft.com/office/infopath/2007/PartnerControls">
-  <documentManagement/>
-</p:properties>
-</file>
-
-<file path=customXml/item3.xml><?xml version="1.0" encoding="utf-8"?>
 <ct:contentTypeSchema xmlns:ct="http://schemas.microsoft.com/office/2006/metadata/contentType" xmlns:ma="http://schemas.microsoft.com/office/2006/metadata/properties/metaAttributes" ct:_="" ma:_="" ma:contentTypeName="Document" ma:contentTypeID="0x0101003077E6D4C54119439DB8E5381724DDAA" ma:contentTypeVersion="3" ma:contentTypeDescription="Create a new document." ma:contentTypeScope="" ma:versionID="35325c12c4b8970beabc35f2e2efcbb5">
   <xsd:schema xmlns:xsd="http://www.w3.org/2001/XMLSchema" xmlns:xs="http://www.w3.org/2001/XMLSchema" xmlns:p="http://schemas.microsoft.com/office/2006/metadata/properties" xmlns:ns2="67d1ba68-3275-44c2-9ddb-2f8511f2ccbb" targetNamespace="http://schemas.microsoft.com/office/2006/metadata/properties" ma:root="true" ma:fieldsID="33e6c1fa542cdacee9e5295060f101a2" ns2:_="">
     <xsd:import namespace="67d1ba68-3275-44c2-9ddb-2f8511f2ccbb"/>
@@ -6179,10 +7243,35 @@
 </ct:contentTypeSchema>
 </file>
 
+<file path=customXml/item2.xml><?xml version="1.0" encoding="utf-8"?>
+<p:properties xmlns:p="http://schemas.microsoft.com/office/2006/metadata/properties" xmlns:xsi="http://www.w3.org/2001/XMLSchema-instance" xmlns:pc="http://schemas.microsoft.com/office/infopath/2007/PartnerControls">
+  <documentManagement/>
+</p:properties>
+</file>
+
+<file path=customXml/item3.xml><?xml version="1.0" encoding="utf-8"?>
+<?mso-contentType ?>
+<FormTemplates xmlns="http://schemas.microsoft.com/sharepoint/v3/contenttype/forms">
+  <Display>DocumentLibraryForm</Display>
+  <Edit>DocumentLibraryForm</Edit>
+  <New>DocumentLibraryForm</New>
+</FormTemplates>
+</file>
+
 <file path=customXml/itemProps1.xml><?xml version="1.0" encoding="utf-8"?>
-<ds:datastoreItem xmlns:ds="http://schemas.openxmlformats.org/officeDocument/2006/customXml" ds:itemID="{74BCA57B-8451-400D-AF6D-A9DBB4806AF2}">
+<ds:datastoreItem xmlns:ds="http://schemas.openxmlformats.org/officeDocument/2006/customXml" ds:itemID="{3A2EFE34-A918-4452-B6BD-4425E6B1970F}">
   <ds:schemaRefs>
-    <ds:schemaRef ds:uri="http://schemas.microsoft.com/sharepoint/v3/contenttype/forms"/>
+    <ds:schemaRef ds:uri="http://schemas.microsoft.com/office/2006/metadata/contentType"/>
+    <ds:schemaRef ds:uri="http://schemas.microsoft.com/office/2006/metadata/properties/metaAttributes"/>
+    <ds:schemaRef ds:uri="http://www.w3.org/2001/XMLSchema"/>
+    <ds:schemaRef ds:uri="http://schemas.microsoft.com/office/2006/metadata/properties"/>
+    <ds:schemaRef ds:uri="67d1ba68-3275-44c2-9ddb-2f8511f2ccbb"/>
+    <ds:schemaRef ds:uri="http://schemas.microsoft.com/office/2006/documentManagement/types"/>
+    <ds:schemaRef ds:uri="http://schemas.microsoft.com/office/infopath/2007/PartnerControls"/>
+    <ds:schemaRef ds:uri="http://schemas.openxmlformats.org/package/2006/metadata/core-properties"/>
+    <ds:schemaRef ds:uri="http://purl.org/dc/elements/1.1/"/>
+    <ds:schemaRef ds:uri="http://purl.org/dc/terms/"/>
+    <ds:schemaRef ds:uri="http://schemas.microsoft.com/internal/obd"/>
   </ds:schemaRefs>
 </ds:datastoreItem>
 </file>
@@ -6204,19 +7293,9 @@
 </file>
 
 <file path=customXml/itemProps3.xml><?xml version="1.0" encoding="utf-8"?>
-<ds:datastoreItem xmlns:ds="http://schemas.openxmlformats.org/officeDocument/2006/customXml" ds:itemID="{3A2EFE34-A918-4452-B6BD-4425E6B1970F}">
+<ds:datastoreItem xmlns:ds="http://schemas.openxmlformats.org/officeDocument/2006/customXml" ds:itemID="{74BCA57B-8451-400D-AF6D-A9DBB4806AF2}">
   <ds:schemaRefs>
-    <ds:schemaRef ds:uri="http://schemas.microsoft.com/office/2006/metadata/contentType"/>
-    <ds:schemaRef ds:uri="http://schemas.microsoft.com/office/2006/metadata/properties/metaAttributes"/>
-    <ds:schemaRef ds:uri="http://www.w3.org/2001/XMLSchema"/>
-    <ds:schemaRef ds:uri="http://schemas.microsoft.com/office/2006/metadata/properties"/>
-    <ds:schemaRef ds:uri="67d1ba68-3275-44c2-9ddb-2f8511f2ccbb"/>
-    <ds:schemaRef ds:uri="http://schemas.microsoft.com/office/2006/documentManagement/types"/>
-    <ds:schemaRef ds:uri="http://schemas.microsoft.com/office/infopath/2007/PartnerControls"/>
-    <ds:schemaRef ds:uri="http://schemas.openxmlformats.org/package/2006/metadata/core-properties"/>
-    <ds:schemaRef ds:uri="http://purl.org/dc/elements/1.1/"/>
-    <ds:schemaRef ds:uri="http://purl.org/dc/terms/"/>
-    <ds:schemaRef ds:uri="http://schemas.microsoft.com/internal/obd"/>
+    <ds:schemaRef ds:uri="http://schemas.microsoft.com/sharepoint/v3/contenttype/forms"/>
   </ds:schemaRefs>
 </ds:datastoreItem>
 </file>
</xml_diff>

<commit_message>
#599: Local testing correct.
</commit_message>
<xml_diff>
--- a/Articles/599/images/PythonAsAService.pptx
+++ b/Articles/599/images/PythonAsAService.pptx
@@ -5,18 +5,17 @@
     <p:sldMasterId id="2147483684" r:id="rId4"/>
   </p:sldMasterIdLst>
   <p:notesMasterIdLst>
-    <p:notesMasterId r:id="rId11"/>
+    <p:notesMasterId r:id="rId10"/>
   </p:notesMasterIdLst>
   <p:handoutMasterIdLst>
-    <p:handoutMasterId r:id="rId12"/>
+    <p:handoutMasterId r:id="rId11"/>
   </p:handoutMasterIdLst>
   <p:sldIdLst>
     <p:sldId id="256" r:id="rId5"/>
-    <p:sldId id="261" r:id="rId6"/>
-    <p:sldId id="257" r:id="rId7"/>
-    <p:sldId id="258" r:id="rId8"/>
-    <p:sldId id="259" r:id="rId9"/>
-    <p:sldId id="260" r:id="rId10"/>
+    <p:sldId id="257" r:id="rId6"/>
+    <p:sldId id="258" r:id="rId7"/>
+    <p:sldId id="259" r:id="rId8"/>
+    <p:sldId id="260" r:id="rId9"/>
   </p:sldIdLst>
   <p:sldSz cx="12192000" cy="6858000"/>
   <p:notesSz cx="6858000" cy="9144000"/>
@@ -252,7 +251,7 @@
             <a:fld id="{B1603AB5-52B7-8045-BEFE-97F8347DAEAC}" type="datetimeFigureOut">
               <a:rPr lang="en-US" smtClean="0"/>
               <a:pPr/>
-              <a:t>3/4/2024</a:t>
+              <a:t>3/5/2024</a:t>
             </a:fld>
             <a:endParaRPr lang="en-US"/>
           </a:p>
@@ -420,7 +419,7 @@
             <a:fld id="{EFF03303-0379-0E48-9B93-EC7286F8FEE5}" type="datetimeFigureOut">
               <a:rPr lang="en-US" smtClean="0"/>
               <a:pPr/>
-              <a:t>3/4/2024</a:t>
+              <a:t>3/5/2024</a:t>
             </a:fld>
             <a:endParaRPr lang="en-US"/>
           </a:p>
@@ -1451,228 +1450,6 @@
 </p:sldLayout>
 </file>
 
-<file path=ppt/slideLayouts/slideLayout13.xml><?xml version="1.0" encoding="utf-8"?>
-<p:sldLayout xmlns:a="http://schemas.openxmlformats.org/drawingml/2006/main" xmlns:r="http://schemas.openxmlformats.org/officeDocument/2006/relationships" xmlns:p="http://schemas.openxmlformats.org/presentationml/2006/main" type="title">
-  <p:cSld name="Title Slide">
-    <p:spTree>
-      <p:nvGrpSpPr>
-        <p:cNvPr id="1" name=""/>
-        <p:cNvGrpSpPr/>
-        <p:nvPr/>
-      </p:nvGrpSpPr>
-      <p:grpSpPr>
-        <a:xfrm>
-          <a:off x="0" y="0"/>
-          <a:ext cx="0" cy="0"/>
-          <a:chOff x="0" y="0"/>
-          <a:chExt cx="0" cy="0"/>
-        </a:xfrm>
-      </p:grpSpPr>
-      <p:sp>
-        <p:nvSpPr>
-          <p:cNvPr id="2" name="Title 1">
-            <a:extLst>
-              <a:ext uri="{FF2B5EF4-FFF2-40B4-BE49-F238E27FC236}">
-                <a16:creationId xmlns:a16="http://schemas.microsoft.com/office/drawing/2014/main" id="{3BA15450-7E44-0130-71AE-935C9A4D22B9}"/>
-              </a:ext>
-            </a:extLst>
-          </p:cNvPr>
-          <p:cNvSpPr>
-            <a:spLocks noGrp="1"/>
-          </p:cNvSpPr>
-          <p:nvPr>
-            <p:ph type="ctrTitle"/>
-          </p:nvPr>
-        </p:nvSpPr>
-        <p:spPr>
-          <a:xfrm>
-            <a:off x="1524000" y="1122363"/>
-            <a:ext cx="9144000" cy="2387600"/>
-          </a:xfrm>
-        </p:spPr>
-        <p:txBody>
-          <a:bodyPr anchor="b"/>
-          <a:lstStyle>
-            <a:lvl1pPr algn="ctr">
-              <a:defRPr sz="6000"/>
-            </a:lvl1pPr>
-          </a:lstStyle>
-          <a:p>
-            <a:r>
-              <a:rPr lang="en-US"/>
-              <a:t>Click to edit Master title style</a:t>
-            </a:r>
-            <a:endParaRPr lang="en-NL"/>
-          </a:p>
-        </p:txBody>
-      </p:sp>
-      <p:sp>
-        <p:nvSpPr>
-          <p:cNvPr id="3" name="Subtitle 2">
-            <a:extLst>
-              <a:ext uri="{FF2B5EF4-FFF2-40B4-BE49-F238E27FC236}">
-                <a16:creationId xmlns:a16="http://schemas.microsoft.com/office/drawing/2014/main" id="{F1CC9C99-433B-73FE-2911-D19A6F6DDBC5}"/>
-              </a:ext>
-            </a:extLst>
-          </p:cNvPr>
-          <p:cNvSpPr>
-            <a:spLocks noGrp="1"/>
-          </p:cNvSpPr>
-          <p:nvPr>
-            <p:ph type="subTitle" idx="1"/>
-          </p:nvPr>
-        </p:nvSpPr>
-        <p:spPr>
-          <a:xfrm>
-            <a:off x="1524000" y="3602038"/>
-            <a:ext cx="9144000" cy="1655762"/>
-          </a:xfrm>
-        </p:spPr>
-        <p:txBody>
-          <a:bodyPr/>
-          <a:lstStyle>
-            <a:lvl1pPr marL="0" indent="0" algn="ctr">
-              <a:buNone/>
-              <a:defRPr sz="2400"/>
-            </a:lvl1pPr>
-            <a:lvl2pPr marL="457200" indent="0" algn="ctr">
-              <a:buNone/>
-              <a:defRPr sz="2000"/>
-            </a:lvl2pPr>
-            <a:lvl3pPr marL="914400" indent="0" algn="ctr">
-              <a:buNone/>
-              <a:defRPr sz="1800"/>
-            </a:lvl3pPr>
-            <a:lvl4pPr marL="1371600" indent="0" algn="ctr">
-              <a:buNone/>
-              <a:defRPr sz="1600"/>
-            </a:lvl4pPr>
-            <a:lvl5pPr marL="1828800" indent="0" algn="ctr">
-              <a:buNone/>
-              <a:defRPr sz="1600"/>
-            </a:lvl5pPr>
-            <a:lvl6pPr marL="2286000" indent="0" algn="ctr">
-              <a:buNone/>
-              <a:defRPr sz="1600"/>
-            </a:lvl6pPr>
-            <a:lvl7pPr marL="2743200" indent="0" algn="ctr">
-              <a:buNone/>
-              <a:defRPr sz="1600"/>
-            </a:lvl7pPr>
-            <a:lvl8pPr marL="3200400" indent="0" algn="ctr">
-              <a:buNone/>
-              <a:defRPr sz="1600"/>
-            </a:lvl8pPr>
-            <a:lvl9pPr marL="3657600" indent="0" algn="ctr">
-              <a:buNone/>
-              <a:defRPr sz="1600"/>
-            </a:lvl9pPr>
-          </a:lstStyle>
-          <a:p>
-            <a:r>
-              <a:rPr lang="en-US"/>
-              <a:t>Click to edit Master subtitle style</a:t>
-            </a:r>
-            <a:endParaRPr lang="en-NL"/>
-          </a:p>
-        </p:txBody>
-      </p:sp>
-      <p:sp>
-        <p:nvSpPr>
-          <p:cNvPr id="4" name="Date Placeholder 3">
-            <a:extLst>
-              <a:ext uri="{FF2B5EF4-FFF2-40B4-BE49-F238E27FC236}">
-                <a16:creationId xmlns:a16="http://schemas.microsoft.com/office/drawing/2014/main" id="{3857A261-A192-D1F4-08EF-C5536DCAE76C}"/>
-              </a:ext>
-            </a:extLst>
-          </p:cNvPr>
-          <p:cNvSpPr>
-            <a:spLocks noGrp="1"/>
-          </p:cNvSpPr>
-          <p:nvPr>
-            <p:ph type="dt" sz="half" idx="10"/>
-          </p:nvPr>
-        </p:nvSpPr>
-        <p:spPr/>
-        <p:txBody>
-          <a:bodyPr/>
-          <a:lstStyle/>
-          <a:p>
-            <a:fld id="{E210160B-521D-4D45-B779-2595A8683FA3}" type="datetimeFigureOut">
-              <a:rPr lang="en-NL" smtClean="0"/>
-              <a:t>04/03/2024</a:t>
-            </a:fld>
-            <a:endParaRPr lang="en-NL"/>
-          </a:p>
-        </p:txBody>
-      </p:sp>
-      <p:sp>
-        <p:nvSpPr>
-          <p:cNvPr id="5" name="Footer Placeholder 4">
-            <a:extLst>
-              <a:ext uri="{FF2B5EF4-FFF2-40B4-BE49-F238E27FC236}">
-                <a16:creationId xmlns:a16="http://schemas.microsoft.com/office/drawing/2014/main" id="{6859E367-3480-092C-15E8-A6B886AAB619}"/>
-              </a:ext>
-            </a:extLst>
-          </p:cNvPr>
-          <p:cNvSpPr>
-            <a:spLocks noGrp="1"/>
-          </p:cNvSpPr>
-          <p:nvPr>
-            <p:ph type="ftr" sz="quarter" idx="11"/>
-          </p:nvPr>
-        </p:nvSpPr>
-        <p:spPr/>
-        <p:txBody>
-          <a:bodyPr/>
-          <a:lstStyle/>
-          <a:p>
-            <a:endParaRPr lang="en-NL"/>
-          </a:p>
-        </p:txBody>
-      </p:sp>
-      <p:sp>
-        <p:nvSpPr>
-          <p:cNvPr id="6" name="Slide Number Placeholder 5">
-            <a:extLst>
-              <a:ext uri="{FF2B5EF4-FFF2-40B4-BE49-F238E27FC236}">
-                <a16:creationId xmlns:a16="http://schemas.microsoft.com/office/drawing/2014/main" id="{396E69F6-D486-E58D-66E0-E6F87EE16BA5}"/>
-              </a:ext>
-            </a:extLst>
-          </p:cNvPr>
-          <p:cNvSpPr>
-            <a:spLocks noGrp="1"/>
-          </p:cNvSpPr>
-          <p:nvPr>
-            <p:ph type="sldNum" sz="quarter" idx="12"/>
-          </p:nvPr>
-        </p:nvSpPr>
-        <p:spPr/>
-        <p:txBody>
-          <a:bodyPr/>
-          <a:lstStyle/>
-          <a:p>
-            <a:fld id="{4EF0B0E8-7778-4A72-90AF-58E7B9F10958}" type="slidenum">
-              <a:rPr lang="en-NL" smtClean="0"/>
-              <a:t>‹#›</a:t>
-            </a:fld>
-            <a:endParaRPr lang="en-NL"/>
-          </a:p>
-        </p:txBody>
-      </p:sp>
-    </p:spTree>
-    <p:extLst>
-      <p:ext uri="{BB962C8B-B14F-4D97-AF65-F5344CB8AC3E}">
-        <p14:creationId xmlns:p14="http://schemas.microsoft.com/office/powerpoint/2010/main" val="305604389"/>
-      </p:ext>
-    </p:extLst>
-  </p:cSld>
-  <p:clrMapOvr>
-    <a:masterClrMapping/>
-  </p:clrMapOvr>
-</p:sldLayout>
-</file>
-
 <file path=ppt/slideLayouts/slideLayout2.xml><?xml version="1.0" encoding="utf-8"?>
 <p:sldLayout xmlns:a="http://schemas.openxmlformats.org/drawingml/2006/main" xmlns:r="http://schemas.openxmlformats.org/officeDocument/2006/relationships" xmlns:p="http://schemas.openxmlformats.org/presentationml/2006/main" preserve="1" userDrawn="1">
   <p:cSld name="Title Black - 1">
@@ -4013,7 +3790,7 @@
           <p:nvPr userDrawn="1"/>
         </p:nvPicPr>
         <p:blipFill>
-          <a:blip r:embed="rId15">
+          <a:blip r:embed="rId14">
             <a:extLst>
               <a:ext uri="{28A0092B-C50C-407E-A947-70E740481C1C}">
                 <a14:useLocalDpi xmlns:a14="http://schemas.microsoft.com/office/drawing/2010/main" val="0"/>
@@ -4055,7 +3832,6 @@
     <p:sldLayoutId id="2147483741" r:id="rId10"/>
     <p:sldLayoutId id="2147483746" r:id="rId11"/>
     <p:sldLayoutId id="2147483747" r:id="rId12"/>
-    <p:sldLayoutId id="2147483748" r:id="rId13"/>
   </p:sldLayoutIdLst>
   <p:hf hdr="0"/>
   <p:txStyles>
@@ -4548,861 +4324,6 @@
           <a:chExt cx="0" cy="0"/>
         </a:xfrm>
       </p:grpSpPr>
-      <p:pic>
-        <p:nvPicPr>
-          <p:cNvPr id="1026" name="Picture 2">
-            <a:extLst>
-              <a:ext uri="{FF2B5EF4-FFF2-40B4-BE49-F238E27FC236}">
-                <a16:creationId xmlns:a16="http://schemas.microsoft.com/office/drawing/2014/main" id="{F68B260B-1D82-E54C-6ACF-966415D5AEE1}"/>
-              </a:ext>
-            </a:extLst>
-          </p:cNvPr>
-          <p:cNvPicPr>
-            <a:picLocks noChangeAspect="1" noChangeArrowheads="1"/>
-          </p:cNvPicPr>
-          <p:nvPr/>
-        </p:nvPicPr>
-        <p:blipFill>
-          <a:blip r:embed="rId2">
-            <a:extLst>
-              <a:ext uri="{28A0092B-C50C-407E-A947-70E740481C1C}">
-                <a14:useLocalDpi xmlns:a14="http://schemas.microsoft.com/office/drawing/2010/main" val="0"/>
-              </a:ext>
-            </a:extLst>
-          </a:blip>
-          <a:srcRect/>
-          <a:stretch>
-            <a:fillRect/>
-          </a:stretch>
-        </p:blipFill>
-        <p:spPr bwMode="auto">
-          <a:xfrm>
-            <a:off x="689610" y="-1255824"/>
-            <a:ext cx="10172700" cy="3362325"/>
-          </a:xfrm>
-          <a:prstGeom prst="rect">
-            <a:avLst/>
-          </a:prstGeom>
-          <a:noFill/>
-          <a:extLst>
-            <a:ext uri="{909E8E84-426E-40DD-AFC4-6F175D3DCCD1}">
-              <a14:hiddenFill xmlns:a14="http://schemas.microsoft.com/office/drawing/2010/main">
-                <a:solidFill>
-                  <a:srgbClr val="FFFFFF"/>
-                </a:solidFill>
-              </a14:hiddenFill>
-            </a:ext>
-          </a:extLst>
-        </p:spPr>
-      </p:pic>
-      <p:sp>
-        <p:nvSpPr>
-          <p:cNvPr id="5" name="Rectangle 4">
-            <a:extLst>
-              <a:ext uri="{FF2B5EF4-FFF2-40B4-BE49-F238E27FC236}">
-                <a16:creationId xmlns:a16="http://schemas.microsoft.com/office/drawing/2014/main" id="{FED839CB-63F4-B2D1-16BB-426C15A8BEEE}"/>
-              </a:ext>
-            </a:extLst>
-          </p:cNvPr>
-          <p:cNvSpPr/>
-          <p:nvPr/>
-        </p:nvSpPr>
-        <p:spPr>
-          <a:xfrm>
-            <a:off x="8932696" y="2504221"/>
-            <a:ext cx="1577603" cy="3121572"/>
-          </a:xfrm>
-          <a:prstGeom prst="rect">
-            <a:avLst/>
-          </a:prstGeom>
-          <a:solidFill>
-            <a:schemeClr val="accent2"/>
-          </a:solidFill>
-          <a:ln>
-            <a:noFill/>
-          </a:ln>
-        </p:spPr>
-        <p:style>
-          <a:lnRef idx="0">
-            <a:scrgbClr r="0" g="0" b="0"/>
-          </a:lnRef>
-          <a:fillRef idx="0">
-            <a:scrgbClr r="0" g="0" b="0"/>
-          </a:fillRef>
-          <a:effectRef idx="0">
-            <a:scrgbClr r="0" g="0" b="0"/>
-          </a:effectRef>
-          <a:fontRef idx="minor">
-            <a:schemeClr val="lt1"/>
-          </a:fontRef>
-        </p:style>
-        <p:txBody>
-          <a:bodyPr rtlCol="0" anchor="ctr"/>
-          <a:lstStyle/>
-          <a:p>
-            <a:pPr algn="ctr"/>
-            <a:r>
-              <a:rPr lang="pt-BR" dirty="0">
-                <a:latin typeface="Avenir Next LT Pro" panose="020B0504020202020204" pitchFamily="34" charset="0"/>
-              </a:rPr>
-              <a:t>Server ABC</a:t>
-            </a:r>
-          </a:p>
-        </p:txBody>
-      </p:sp>
-      <p:sp>
-        <p:nvSpPr>
-          <p:cNvPr id="2" name="Rectangle 1">
-            <a:extLst>
-              <a:ext uri="{FF2B5EF4-FFF2-40B4-BE49-F238E27FC236}">
-                <a16:creationId xmlns:a16="http://schemas.microsoft.com/office/drawing/2014/main" id="{917F88EB-6919-752C-67AB-01FDA0AABDFB}"/>
-              </a:ext>
-            </a:extLst>
-          </p:cNvPr>
-          <p:cNvSpPr/>
-          <p:nvPr/>
-        </p:nvSpPr>
-        <p:spPr>
-          <a:xfrm>
-            <a:off x="1149016" y="2504221"/>
-            <a:ext cx="6196263" cy="3121572"/>
-          </a:xfrm>
-          <a:prstGeom prst="rect">
-            <a:avLst/>
-          </a:prstGeom>
-          <a:solidFill>
-            <a:schemeClr val="accent2"/>
-          </a:solidFill>
-          <a:ln>
-            <a:noFill/>
-          </a:ln>
-        </p:spPr>
-        <p:style>
-          <a:lnRef idx="0">
-            <a:scrgbClr r="0" g="0" b="0"/>
-          </a:lnRef>
-          <a:fillRef idx="0">
-            <a:scrgbClr r="0" g="0" b="0"/>
-          </a:fillRef>
-          <a:effectRef idx="0">
-            <a:scrgbClr r="0" g="0" b="0"/>
-          </a:effectRef>
-          <a:fontRef idx="minor">
-            <a:schemeClr val="lt1"/>
-          </a:fontRef>
-        </p:style>
-        <p:txBody>
-          <a:bodyPr rtlCol="0" anchor="ctr"/>
-          <a:lstStyle/>
-          <a:p>
-            <a:pPr algn="ctr"/>
-            <a:endParaRPr lang="en-NL" sz="1400"/>
-          </a:p>
-        </p:txBody>
-      </p:sp>
-      <p:sp>
-        <p:nvSpPr>
-          <p:cNvPr id="3" name="Rectangle 2">
-            <a:extLst>
-              <a:ext uri="{FF2B5EF4-FFF2-40B4-BE49-F238E27FC236}">
-                <a16:creationId xmlns:a16="http://schemas.microsoft.com/office/drawing/2014/main" id="{9F11AAE9-9BD4-A9DA-9BCB-D2BD00E03FF5}"/>
-              </a:ext>
-            </a:extLst>
-          </p:cNvPr>
-          <p:cNvSpPr/>
-          <p:nvPr/>
-        </p:nvSpPr>
-        <p:spPr>
-          <a:xfrm>
-            <a:off x="1623766" y="3299661"/>
-            <a:ext cx="1577603" cy="2063442"/>
-          </a:xfrm>
-          <a:prstGeom prst="rect">
-            <a:avLst/>
-          </a:prstGeom>
-          <a:solidFill>
-            <a:schemeClr val="tx2"/>
-          </a:solidFill>
-          <a:ln>
-            <a:noFill/>
-          </a:ln>
-        </p:spPr>
-        <p:style>
-          <a:lnRef idx="2">
-            <a:schemeClr val="accent1">
-              <a:shade val="15000"/>
-            </a:schemeClr>
-          </a:lnRef>
-          <a:fillRef idx="1">
-            <a:schemeClr val="accent1"/>
-          </a:fillRef>
-          <a:effectRef idx="0">
-            <a:schemeClr val="accent1"/>
-          </a:effectRef>
-          <a:fontRef idx="minor">
-            <a:schemeClr val="lt1"/>
-          </a:fontRef>
-        </p:style>
-        <p:txBody>
-          <a:bodyPr rtlCol="0" anchor="ctr"/>
-          <a:lstStyle/>
-          <a:p>
-            <a:pPr algn="ctr"/>
-            <a:r>
-              <a:rPr lang="pt-BR" dirty="0">
-                <a:latin typeface="Avenir Next LT Pro" panose="020B0504020202020204" pitchFamily="34" charset="0"/>
-              </a:rPr>
-              <a:t>AIMMS Application Data Structures </a:t>
-            </a:r>
-            <a:r>
-              <a:rPr lang="pt-BR" sz="1400" dirty="0">
-                <a:latin typeface="Avenir Next LT Pro" panose="020B0504020202020204" pitchFamily="34" charset="0"/>
-              </a:rPr>
-              <a:t>(algebraic notation)</a:t>
-            </a:r>
-            <a:endParaRPr lang="en-NL" dirty="0">
-              <a:latin typeface="Avenir Next LT Pro" panose="020B0504020202020204" pitchFamily="34" charset="0"/>
-            </a:endParaRPr>
-          </a:p>
-        </p:txBody>
-      </p:sp>
-      <p:sp>
-        <p:nvSpPr>
-          <p:cNvPr id="6" name="Rectangle 5">
-            <a:extLst>
-              <a:ext uri="{FF2B5EF4-FFF2-40B4-BE49-F238E27FC236}">
-                <a16:creationId xmlns:a16="http://schemas.microsoft.com/office/drawing/2014/main" id="{FCDB81BF-9D3D-61E7-55A1-447E817955D2}"/>
-              </a:ext>
-            </a:extLst>
-          </p:cNvPr>
-          <p:cNvSpPr/>
-          <p:nvPr/>
-        </p:nvSpPr>
-        <p:spPr>
-          <a:xfrm>
-            <a:off x="5209467" y="3299661"/>
-            <a:ext cx="1577603" cy="2063442"/>
-          </a:xfrm>
-          <a:prstGeom prst="rect">
-            <a:avLst/>
-          </a:prstGeom>
-          <a:solidFill>
-            <a:schemeClr val="accent1"/>
-          </a:solidFill>
-          <a:ln>
-            <a:noFill/>
-          </a:ln>
-        </p:spPr>
-        <p:style>
-          <a:lnRef idx="0">
-            <a:scrgbClr r="0" g="0" b="0"/>
-          </a:lnRef>
-          <a:fillRef idx="0">
-            <a:scrgbClr r="0" g="0" b="0"/>
-          </a:fillRef>
-          <a:effectRef idx="0">
-            <a:scrgbClr r="0" g="0" b="0"/>
-          </a:effectRef>
-          <a:fontRef idx="minor">
-            <a:schemeClr val="lt1"/>
-          </a:fontRef>
-        </p:style>
-        <p:txBody>
-          <a:bodyPr rtlCol="0" anchor="ctr"/>
-          <a:lstStyle/>
-          <a:p>
-            <a:pPr algn="ctr"/>
-            <a:r>
-              <a:rPr lang="pt-BR" dirty="0">
-                <a:latin typeface="Avenir Next LT Pro" panose="020B0504020202020204" pitchFamily="34" charset="0"/>
-              </a:rPr>
-              <a:t>OpenAPI</a:t>
-            </a:r>
-          </a:p>
-          <a:p>
-            <a:pPr algn="ctr"/>
-            <a:endParaRPr lang="pt-BR" dirty="0">
-              <a:latin typeface="Avenir Next LT Pro" panose="020B0504020202020204" pitchFamily="34" charset="0"/>
-            </a:endParaRPr>
-          </a:p>
-          <a:p>
-            <a:pPr algn="ctr"/>
-            <a:r>
-              <a:rPr lang="pt-BR" dirty="0">
-                <a:latin typeface="Avenir Next LT Pro" panose="020B0504020202020204" pitchFamily="34" charset="0"/>
-              </a:rPr>
-              <a:t>Server ABC</a:t>
-            </a:r>
-          </a:p>
-          <a:p>
-            <a:pPr algn="ctr"/>
-            <a:endParaRPr lang="pt-BR" dirty="0">
-              <a:latin typeface="Avenir Next LT Pro" panose="020B0504020202020204" pitchFamily="34" charset="0"/>
-            </a:endParaRPr>
-          </a:p>
-          <a:p>
-            <a:pPr algn="ctr"/>
-            <a:r>
-              <a:rPr lang="pt-BR" dirty="0">
-                <a:latin typeface="Avenir Next LT Pro" panose="020B0504020202020204" pitchFamily="34" charset="0"/>
-              </a:rPr>
-              <a:t>Generated AIMMS Library</a:t>
-            </a:r>
-            <a:endParaRPr lang="en-NL" dirty="0">
-              <a:latin typeface="Avenir Next LT Pro" panose="020B0504020202020204" pitchFamily="34" charset="0"/>
-            </a:endParaRPr>
-          </a:p>
-        </p:txBody>
-      </p:sp>
-      <p:sp>
-        <p:nvSpPr>
-          <p:cNvPr id="7" name="TextBox 6">
-            <a:extLst>
-              <a:ext uri="{FF2B5EF4-FFF2-40B4-BE49-F238E27FC236}">
-                <a16:creationId xmlns:a16="http://schemas.microsoft.com/office/drawing/2014/main" id="{7F29BF55-586F-A0AB-571A-AC1DABE267B0}"/>
-              </a:ext>
-            </a:extLst>
-          </p:cNvPr>
-          <p:cNvSpPr txBox="1"/>
-          <p:nvPr/>
-        </p:nvSpPr>
-        <p:spPr>
-          <a:xfrm>
-            <a:off x="1225216" y="2587792"/>
-            <a:ext cx="2724150" cy="525379"/>
-          </a:xfrm>
-          <a:prstGeom prst="rect">
-            <a:avLst/>
-          </a:prstGeom>
-        </p:spPr>
-        <p:txBody>
-          <a:bodyPr vert="horz" wrap="none" lIns="91440" tIns="45720" rIns="91440" bIns="45720" rtlCol="0" anchor="t">
-            <a:noAutofit/>
-          </a:bodyPr>
-          <a:lstStyle/>
-          <a:p>
-            <a:r>
-              <a:rPr lang="pt-BR" sz="2000" cap="none" baseline="0" dirty="0">
-                <a:solidFill>
-                  <a:schemeClr val="bg1"/>
-                </a:solidFill>
-                <a:latin typeface="Avenir Next LT Pro" panose="020B0504020202020204" pitchFamily="34" charset="0"/>
-              </a:rPr>
-              <a:t>AIMMS Client App</a:t>
-            </a:r>
-            <a:endParaRPr lang="en-NL" sz="2000" cap="none" baseline="0" dirty="0">
-              <a:solidFill>
-                <a:schemeClr val="bg1"/>
-              </a:solidFill>
-              <a:latin typeface="Avenir Next LT Pro" panose="020B0504020202020204" pitchFamily="34" charset="0"/>
-            </a:endParaRPr>
-          </a:p>
-        </p:txBody>
-      </p:sp>
-      <p:sp>
-        <p:nvSpPr>
-          <p:cNvPr id="9" name="Arrow: Right 8">
-            <a:extLst>
-              <a:ext uri="{FF2B5EF4-FFF2-40B4-BE49-F238E27FC236}">
-                <a16:creationId xmlns:a16="http://schemas.microsoft.com/office/drawing/2014/main" id="{022D550D-CCEF-3CB9-2D59-505D40B20F8D}"/>
-              </a:ext>
-            </a:extLst>
-          </p:cNvPr>
-          <p:cNvSpPr/>
-          <p:nvPr/>
-        </p:nvSpPr>
-        <p:spPr>
-          <a:xfrm flipH="1">
-            <a:off x="3270133" y="4914900"/>
-            <a:ext cx="1870570" cy="314325"/>
-          </a:xfrm>
-          <a:prstGeom prst="rightArrow">
-            <a:avLst/>
-          </a:prstGeom>
-          <a:solidFill>
-            <a:schemeClr val="accent6"/>
-          </a:solidFill>
-          <a:ln>
-            <a:noFill/>
-          </a:ln>
-        </p:spPr>
-        <p:style>
-          <a:lnRef idx="0">
-            <a:scrgbClr r="0" g="0" b="0"/>
-          </a:lnRef>
-          <a:fillRef idx="0">
-            <a:scrgbClr r="0" g="0" b="0"/>
-          </a:fillRef>
-          <a:effectRef idx="0">
-            <a:scrgbClr r="0" g="0" b="0"/>
-          </a:effectRef>
-          <a:fontRef idx="minor">
-            <a:schemeClr val="lt1"/>
-          </a:fontRef>
-        </p:style>
-        <p:txBody>
-          <a:bodyPr rtlCol="0" anchor="ctr"/>
-          <a:lstStyle/>
-          <a:p>
-            <a:pPr algn="ctr"/>
-            <a:endParaRPr lang="en-NL"/>
-          </a:p>
-        </p:txBody>
-      </p:sp>
-      <p:sp>
-        <p:nvSpPr>
-          <p:cNvPr id="10" name="Arrow: Right 9">
-            <a:extLst>
-              <a:ext uri="{FF2B5EF4-FFF2-40B4-BE49-F238E27FC236}">
-                <a16:creationId xmlns:a16="http://schemas.microsoft.com/office/drawing/2014/main" id="{F8B91E8E-37E9-0529-A5EC-C210699EC8F3}"/>
-              </a:ext>
-            </a:extLst>
-          </p:cNvPr>
-          <p:cNvSpPr/>
-          <p:nvPr/>
-        </p:nvSpPr>
-        <p:spPr>
-          <a:xfrm flipH="1">
-            <a:off x="6924598" y="4933796"/>
-            <a:ext cx="1870570" cy="314325"/>
-          </a:xfrm>
-          <a:prstGeom prst="rightArrow">
-            <a:avLst/>
-          </a:prstGeom>
-          <a:solidFill>
-            <a:schemeClr val="accent6"/>
-          </a:solidFill>
-          <a:ln>
-            <a:noFill/>
-          </a:ln>
-        </p:spPr>
-        <p:style>
-          <a:lnRef idx="0">
-            <a:scrgbClr r="0" g="0" b="0"/>
-          </a:lnRef>
-          <a:fillRef idx="0">
-            <a:scrgbClr r="0" g="0" b="0"/>
-          </a:fillRef>
-          <a:effectRef idx="0">
-            <a:scrgbClr r="0" g="0" b="0"/>
-          </a:effectRef>
-          <a:fontRef idx="minor">
-            <a:schemeClr val="lt1"/>
-          </a:fontRef>
-        </p:style>
-        <p:txBody>
-          <a:bodyPr rtlCol="0" anchor="ctr"/>
-          <a:lstStyle/>
-          <a:p>
-            <a:pPr algn="ctr"/>
-            <a:endParaRPr lang="en-NL"/>
-          </a:p>
-        </p:txBody>
-      </p:sp>
-      <p:sp>
-        <p:nvSpPr>
-          <p:cNvPr id="13" name="Arrow: Right 12">
-            <a:extLst>
-              <a:ext uri="{FF2B5EF4-FFF2-40B4-BE49-F238E27FC236}">
-                <a16:creationId xmlns:a16="http://schemas.microsoft.com/office/drawing/2014/main" id="{24995AAA-F744-9034-4E4B-69E47F02F777}"/>
-              </a:ext>
-            </a:extLst>
-          </p:cNvPr>
-          <p:cNvSpPr/>
-          <p:nvPr/>
-        </p:nvSpPr>
-        <p:spPr>
-          <a:xfrm>
-            <a:off x="3264769" y="3728935"/>
-            <a:ext cx="1870570" cy="314325"/>
-          </a:xfrm>
-          <a:prstGeom prst="rightArrow">
-            <a:avLst/>
-          </a:prstGeom>
-          <a:solidFill>
-            <a:schemeClr val="accent6"/>
-          </a:solidFill>
-          <a:ln>
-            <a:noFill/>
-          </a:ln>
-        </p:spPr>
-        <p:style>
-          <a:lnRef idx="0">
-            <a:scrgbClr r="0" g="0" b="0"/>
-          </a:lnRef>
-          <a:fillRef idx="0">
-            <a:scrgbClr r="0" g="0" b="0"/>
-          </a:fillRef>
-          <a:effectRef idx="0">
-            <a:scrgbClr r="0" g="0" b="0"/>
-          </a:effectRef>
-          <a:fontRef idx="minor">
-            <a:schemeClr val="lt1"/>
-          </a:fontRef>
-        </p:style>
-        <p:txBody>
-          <a:bodyPr rtlCol="0" anchor="ctr"/>
-          <a:lstStyle/>
-          <a:p>
-            <a:pPr algn="ctr"/>
-            <a:endParaRPr lang="en-NL"/>
-          </a:p>
-        </p:txBody>
-      </p:sp>
-      <p:sp>
-        <p:nvSpPr>
-          <p:cNvPr id="14" name="Arrow: Right 13">
-            <a:extLst>
-              <a:ext uri="{FF2B5EF4-FFF2-40B4-BE49-F238E27FC236}">
-                <a16:creationId xmlns:a16="http://schemas.microsoft.com/office/drawing/2014/main" id="{CCAC54D7-1656-0534-2FA7-1D769BEB3DBA}"/>
-              </a:ext>
-            </a:extLst>
-          </p:cNvPr>
-          <p:cNvSpPr/>
-          <p:nvPr/>
-        </p:nvSpPr>
-        <p:spPr>
-          <a:xfrm>
-            <a:off x="6924598" y="3726390"/>
-            <a:ext cx="1870570" cy="314325"/>
-          </a:xfrm>
-          <a:prstGeom prst="rightArrow">
-            <a:avLst/>
-          </a:prstGeom>
-          <a:solidFill>
-            <a:schemeClr val="accent6"/>
-          </a:solidFill>
-          <a:ln>
-            <a:noFill/>
-          </a:ln>
-        </p:spPr>
-        <p:style>
-          <a:lnRef idx="0">
-            <a:scrgbClr r="0" g="0" b="0"/>
-          </a:lnRef>
-          <a:fillRef idx="0">
-            <a:scrgbClr r="0" g="0" b="0"/>
-          </a:fillRef>
-          <a:effectRef idx="0">
-            <a:scrgbClr r="0" g="0" b="0"/>
-          </a:effectRef>
-          <a:fontRef idx="minor">
-            <a:schemeClr val="lt1"/>
-          </a:fontRef>
-        </p:style>
-        <p:txBody>
-          <a:bodyPr rtlCol="0" anchor="ctr"/>
-          <a:lstStyle/>
-          <a:p>
-            <a:pPr algn="ctr"/>
-            <a:endParaRPr lang="en-NL"/>
-          </a:p>
-        </p:txBody>
-      </p:sp>
-      <p:sp>
-        <p:nvSpPr>
-          <p:cNvPr id="15" name="TextBox 14">
-            <a:extLst>
-              <a:ext uri="{FF2B5EF4-FFF2-40B4-BE49-F238E27FC236}">
-                <a16:creationId xmlns:a16="http://schemas.microsoft.com/office/drawing/2014/main" id="{F73D7C21-78BA-192E-386F-B93437D03006}"/>
-              </a:ext>
-            </a:extLst>
-          </p:cNvPr>
-          <p:cNvSpPr txBox="1"/>
-          <p:nvPr/>
-        </p:nvSpPr>
-        <p:spPr>
-          <a:xfrm>
-            <a:off x="7164208" y="3335764"/>
-            <a:ext cx="1311642" cy="393171"/>
-          </a:xfrm>
-          <a:prstGeom prst="rect">
-            <a:avLst/>
-          </a:prstGeom>
-          <a:solidFill>
-            <a:srgbClr val="575757"/>
-          </a:solidFill>
-        </p:spPr>
-        <p:txBody>
-          <a:bodyPr vert="horz" wrap="none" lIns="91440" tIns="45720" rIns="91440" bIns="45720" rtlCol="0" anchor="ctr">
-            <a:noAutofit/>
-          </a:bodyPr>
-          <a:lstStyle/>
-          <a:p>
-            <a:pPr algn="ctr"/>
-            <a:r>
-              <a:rPr lang="pt-BR" sz="1050" cap="none" baseline="0" dirty="0">
-                <a:solidFill>
-                  <a:schemeClr val="bg1"/>
-                </a:solidFill>
-                <a:latin typeface="Avenir Next LT Pro" panose="020B0504020202020204" pitchFamily="34" charset="0"/>
-              </a:rPr>
-              <a:t>2 - Request Data </a:t>
-            </a:r>
-          </a:p>
-          <a:p>
-            <a:pPr algn="ctr"/>
-            <a:r>
-              <a:rPr lang="pt-BR" sz="1050" cap="none" baseline="0" dirty="0">
-                <a:solidFill>
-                  <a:schemeClr val="bg1"/>
-                </a:solidFill>
-                <a:latin typeface="Avenir Next LT Pro" panose="020B0504020202020204" pitchFamily="34" charset="0"/>
-              </a:rPr>
-              <a:t>(Server Format)</a:t>
-            </a:r>
-            <a:endParaRPr lang="en-NL" sz="1050" cap="none" baseline="0" dirty="0">
-              <a:solidFill>
-                <a:schemeClr val="bg1"/>
-              </a:solidFill>
-              <a:latin typeface="Avenir Next LT Pro" panose="020B0504020202020204" pitchFamily="34" charset="0"/>
-            </a:endParaRPr>
-          </a:p>
-        </p:txBody>
-      </p:sp>
-      <p:sp>
-        <p:nvSpPr>
-          <p:cNvPr id="16" name="TextBox 15">
-            <a:extLst>
-              <a:ext uri="{FF2B5EF4-FFF2-40B4-BE49-F238E27FC236}">
-                <a16:creationId xmlns:a16="http://schemas.microsoft.com/office/drawing/2014/main" id="{B1A9F5D7-0C98-9BAD-048F-6B359F2552AF}"/>
-              </a:ext>
-            </a:extLst>
-          </p:cNvPr>
-          <p:cNvSpPr txBox="1"/>
-          <p:nvPr/>
-        </p:nvSpPr>
-        <p:spPr>
-          <a:xfrm>
-            <a:off x="7164208" y="4540625"/>
-            <a:ext cx="1311642" cy="393171"/>
-          </a:xfrm>
-          <a:prstGeom prst="rect">
-            <a:avLst/>
-          </a:prstGeom>
-          <a:solidFill>
-            <a:srgbClr val="575757"/>
-          </a:solidFill>
-        </p:spPr>
-        <p:txBody>
-          <a:bodyPr vert="horz" wrap="none" lIns="91440" tIns="45720" rIns="91440" bIns="45720" rtlCol="0" anchor="ctr">
-            <a:noAutofit/>
-          </a:bodyPr>
-          <a:lstStyle/>
-          <a:p>
-            <a:pPr algn="ctr"/>
-            <a:r>
-              <a:rPr lang="pt-BR" sz="1050" cap="none" baseline="0" dirty="0">
-                <a:solidFill>
-                  <a:schemeClr val="bg1"/>
-                </a:solidFill>
-                <a:latin typeface="Avenir Next LT Pro" panose="020B0504020202020204" pitchFamily="34" charset="0"/>
-              </a:rPr>
-              <a:t>3 - Response Data </a:t>
-            </a:r>
-          </a:p>
-          <a:p>
-            <a:pPr algn="ctr"/>
-            <a:r>
-              <a:rPr lang="pt-BR" sz="1050" cap="none" baseline="0" dirty="0">
-                <a:solidFill>
-                  <a:schemeClr val="bg1"/>
-                </a:solidFill>
-                <a:latin typeface="Avenir Next LT Pro" panose="020B0504020202020204" pitchFamily="34" charset="0"/>
-              </a:rPr>
-              <a:t>(Server Format)</a:t>
-            </a:r>
-            <a:endParaRPr lang="en-NL" sz="1050" cap="none" baseline="0" dirty="0">
-              <a:solidFill>
-                <a:schemeClr val="bg1"/>
-              </a:solidFill>
-              <a:latin typeface="Avenir Next LT Pro" panose="020B0504020202020204" pitchFamily="34" charset="0"/>
-            </a:endParaRPr>
-          </a:p>
-        </p:txBody>
-      </p:sp>
-      <p:sp>
-        <p:nvSpPr>
-          <p:cNvPr id="17" name="TextBox 16">
-            <a:extLst>
-              <a:ext uri="{FF2B5EF4-FFF2-40B4-BE49-F238E27FC236}">
-                <a16:creationId xmlns:a16="http://schemas.microsoft.com/office/drawing/2014/main" id="{B66F3DE5-205B-535C-1540-6CA9856614A9}"/>
-              </a:ext>
-            </a:extLst>
-          </p:cNvPr>
-          <p:cNvSpPr txBox="1"/>
-          <p:nvPr/>
-        </p:nvSpPr>
-        <p:spPr>
-          <a:xfrm>
-            <a:off x="3477144" y="3335764"/>
-            <a:ext cx="1311642" cy="393171"/>
-          </a:xfrm>
-          <a:prstGeom prst="rect">
-            <a:avLst/>
-          </a:prstGeom>
-          <a:solidFill>
-            <a:srgbClr val="575757"/>
-          </a:solidFill>
-        </p:spPr>
-        <p:txBody>
-          <a:bodyPr vert="horz" wrap="none" lIns="91440" tIns="45720" rIns="91440" bIns="45720" rtlCol="0" anchor="ctr">
-            <a:noAutofit/>
-          </a:bodyPr>
-          <a:lstStyle/>
-          <a:p>
-            <a:pPr algn="ctr"/>
-            <a:r>
-              <a:rPr lang="pt-BR" sz="1050" cap="none" baseline="0" dirty="0">
-                <a:solidFill>
-                  <a:schemeClr val="bg1"/>
-                </a:solidFill>
-                <a:latin typeface="Avenir Next LT Pro" panose="020B0504020202020204" pitchFamily="34" charset="0"/>
-              </a:rPr>
-              <a:t>1 - Request Data </a:t>
-            </a:r>
-          </a:p>
-          <a:p>
-            <a:pPr algn="ctr"/>
-            <a:r>
-              <a:rPr lang="pt-BR" sz="1050" cap="none" baseline="0" dirty="0">
-                <a:solidFill>
-                  <a:schemeClr val="bg1"/>
-                </a:solidFill>
-                <a:latin typeface="Avenir Next LT Pro" panose="020B0504020202020204" pitchFamily="34" charset="0"/>
-              </a:rPr>
-              <a:t>(AIMMS Format)</a:t>
-            </a:r>
-            <a:endParaRPr lang="en-NL" sz="1050" cap="none" baseline="0" dirty="0">
-              <a:solidFill>
-                <a:schemeClr val="bg1"/>
-              </a:solidFill>
-              <a:latin typeface="Avenir Next LT Pro" panose="020B0504020202020204" pitchFamily="34" charset="0"/>
-            </a:endParaRPr>
-          </a:p>
-        </p:txBody>
-      </p:sp>
-      <p:sp>
-        <p:nvSpPr>
-          <p:cNvPr id="18" name="TextBox 17">
-            <a:extLst>
-              <a:ext uri="{FF2B5EF4-FFF2-40B4-BE49-F238E27FC236}">
-                <a16:creationId xmlns:a16="http://schemas.microsoft.com/office/drawing/2014/main" id="{A428C5BA-62E8-265B-E316-884DA77EB44F}"/>
-              </a:ext>
-            </a:extLst>
-          </p:cNvPr>
-          <p:cNvSpPr txBox="1"/>
-          <p:nvPr/>
-        </p:nvSpPr>
-        <p:spPr>
-          <a:xfrm>
-            <a:off x="3477144" y="4540625"/>
-            <a:ext cx="1311642" cy="393171"/>
-          </a:xfrm>
-          <a:prstGeom prst="rect">
-            <a:avLst/>
-          </a:prstGeom>
-          <a:solidFill>
-            <a:srgbClr val="575757"/>
-          </a:solidFill>
-        </p:spPr>
-        <p:txBody>
-          <a:bodyPr vert="horz" wrap="none" lIns="91440" tIns="45720" rIns="91440" bIns="45720" rtlCol="0" anchor="ctr">
-            <a:noAutofit/>
-          </a:bodyPr>
-          <a:lstStyle/>
-          <a:p>
-            <a:pPr algn="ctr"/>
-            <a:r>
-              <a:rPr lang="pt-BR" sz="1050" cap="none" baseline="0" dirty="0">
-                <a:solidFill>
-                  <a:schemeClr val="bg1"/>
-                </a:solidFill>
-                <a:latin typeface="Avenir Next LT Pro" panose="020B0504020202020204" pitchFamily="34" charset="0"/>
-              </a:rPr>
-              <a:t>4 - Response Data </a:t>
-            </a:r>
-          </a:p>
-          <a:p>
-            <a:pPr algn="ctr"/>
-            <a:r>
-              <a:rPr lang="pt-BR" sz="1050" cap="none" baseline="0" dirty="0">
-                <a:solidFill>
-                  <a:schemeClr val="bg1"/>
-                </a:solidFill>
-                <a:latin typeface="Avenir Next LT Pro" panose="020B0504020202020204" pitchFamily="34" charset="0"/>
-              </a:rPr>
-              <a:t>(AIMMS Format)</a:t>
-            </a:r>
-            <a:endParaRPr lang="en-NL" sz="1050" cap="none" baseline="0" dirty="0">
-              <a:solidFill>
-                <a:schemeClr val="bg1"/>
-              </a:solidFill>
-              <a:latin typeface="Avenir Next LT Pro" panose="020B0504020202020204" pitchFamily="34" charset="0"/>
-            </a:endParaRPr>
-          </a:p>
-        </p:txBody>
-      </p:sp>
-      <p:pic>
-        <p:nvPicPr>
-          <p:cNvPr id="19" name="Picture 18">
-            <a:extLst>
-              <a:ext uri="{FF2B5EF4-FFF2-40B4-BE49-F238E27FC236}">
-                <a16:creationId xmlns:a16="http://schemas.microsoft.com/office/drawing/2014/main" id="{10B3F769-322C-B0F5-0671-A0C617E3CCE0}"/>
-              </a:ext>
-            </a:extLst>
-          </p:cNvPr>
-          <p:cNvPicPr>
-            <a:picLocks noChangeAspect="1"/>
-          </p:cNvPicPr>
-          <p:nvPr/>
-        </p:nvPicPr>
-        <p:blipFill>
-          <a:blip r:embed="rId3"/>
-          <a:stretch>
-            <a:fillRect/>
-          </a:stretch>
-        </p:blipFill>
-        <p:spPr>
-          <a:xfrm>
-            <a:off x="926281" y="3988881"/>
-            <a:ext cx="9364268" cy="3121423"/>
-          </a:xfrm>
-          <a:prstGeom prst="rect">
-            <a:avLst/>
-          </a:prstGeom>
-        </p:spPr>
-      </p:pic>
-    </p:spTree>
-    <p:extLst>
-      <p:ext uri="{BB962C8B-B14F-4D97-AF65-F5344CB8AC3E}">
-        <p14:creationId xmlns:p14="http://schemas.microsoft.com/office/powerpoint/2010/main" val="681598326"/>
-      </p:ext>
-    </p:extLst>
-  </p:cSld>
-  <p:clrMapOvr>
-    <a:masterClrMapping/>
-  </p:clrMapOvr>
-</p:sld>
-</file>
-
-<file path=ppt/slides/slide3.xml><?xml version="1.0" encoding="utf-8"?>
-<p:sld xmlns:a="http://schemas.openxmlformats.org/drawingml/2006/main" xmlns:r="http://schemas.openxmlformats.org/officeDocument/2006/relationships" xmlns:p="http://schemas.openxmlformats.org/presentationml/2006/main">
-  <p:cSld>
-    <p:spTree>
-      <p:nvGrpSpPr>
-        <p:cNvPr id="1" name=""/>
-        <p:cNvGrpSpPr/>
-        <p:nvPr/>
-      </p:nvGrpSpPr>
-      <p:grpSpPr>
-        <a:xfrm>
-          <a:off x="0" y="0"/>
-          <a:ext cx="0" cy="0"/>
-          <a:chOff x="0" y="0"/>
-          <a:chExt cx="0" cy="0"/>
-        </a:xfrm>
-      </p:grpSpPr>
       <p:sp>
         <p:nvSpPr>
           <p:cNvPr id="2" name="Title 1">
@@ -5566,7 +4487,7 @@
             <a:fld id="{937E74B9-F793-1749-8FE6-1D741809000E}" type="slidenum">
               <a:rPr lang="en-US" smtClean="0"/>
               <a:pPr/>
-              <a:t>3</a:t>
+              <a:t>2</a:t>
             </a:fld>
             <a:endParaRPr lang="en-US" dirty="0"/>
           </a:p>
@@ -5585,7 +4506,7 @@
 </p:sld>
 </file>
 
-<file path=ppt/slides/slide4.xml><?xml version="1.0" encoding="utf-8"?>
+<file path=ppt/slides/slide3.xml><?xml version="1.0" encoding="utf-8"?>
 <p:sld xmlns:a="http://schemas.openxmlformats.org/drawingml/2006/main" xmlns:r="http://schemas.openxmlformats.org/officeDocument/2006/relationships" xmlns:p="http://schemas.openxmlformats.org/presentationml/2006/main">
   <p:cSld>
     <p:spTree>
@@ -5727,7 +4648,7 @@
             <a:fld id="{937E74B9-F793-1749-8FE6-1D741809000E}" type="slidenum">
               <a:rPr lang="en-US" smtClean="0"/>
               <a:pPr/>
-              <a:t>4</a:t>
+              <a:t>3</a:t>
             </a:fld>
             <a:endParaRPr lang="en-US" dirty="0"/>
           </a:p>
@@ -5746,7 +4667,7 @@
 </p:sld>
 </file>
 
-<file path=ppt/slides/slide5.xml><?xml version="1.0" encoding="utf-8"?>
+<file path=ppt/slides/slide4.xml><?xml version="1.0" encoding="utf-8"?>
 <p:sld xmlns:a="http://schemas.openxmlformats.org/drawingml/2006/main" xmlns:r="http://schemas.openxmlformats.org/officeDocument/2006/relationships" xmlns:p="http://schemas.openxmlformats.org/presentationml/2006/main">
   <p:cSld>
     <p:spTree>
@@ -5908,7 +4829,7 @@
             <a:fld id="{937E74B9-F793-1749-8FE6-1D741809000E}" type="slidenum">
               <a:rPr lang="en-US" smtClean="0"/>
               <a:pPr/>
-              <a:t>5</a:t>
+              <a:t>4</a:t>
             </a:fld>
             <a:endParaRPr lang="en-US" dirty="0"/>
           </a:p>
@@ -5927,7 +4848,7 @@
 </p:sld>
 </file>
 
-<file path=ppt/slides/slide6.xml><?xml version="1.0" encoding="utf-8"?>
+<file path=ppt/slides/slide5.xml><?xml version="1.0" encoding="utf-8"?>
 <p:sld xmlns:a="http://schemas.openxmlformats.org/drawingml/2006/main" xmlns:r="http://schemas.openxmlformats.org/officeDocument/2006/relationships" xmlns:p="http://schemas.openxmlformats.org/presentationml/2006/main">
   <p:cSld>
     <p:spTree>
@@ -6088,7 +5009,7 @@
             <a:fld id="{937E74B9-F793-1749-8FE6-1D741809000E}" type="slidenum">
               <a:rPr lang="en-US" smtClean="0"/>
               <a:pPr/>
-              <a:t>6</a:t>
+              <a:t>5</a:t>
             </a:fld>
             <a:endParaRPr lang="en-US" dirty="0"/>
           </a:p>
@@ -7090,6 +6011,12 @@
 </file>
 
 <file path=customXml/item1.xml><?xml version="1.0" encoding="utf-8"?>
+<p:properties xmlns:p="http://schemas.microsoft.com/office/2006/metadata/properties" xmlns:xsi="http://www.w3.org/2001/XMLSchema-instance" xmlns:pc="http://schemas.microsoft.com/office/infopath/2007/PartnerControls">
+  <documentManagement/>
+</p:properties>
+</file>
+
+<file path=customXml/item2.xml><?xml version="1.0" encoding="utf-8"?>
 <ct:contentTypeSchema xmlns:ct="http://schemas.microsoft.com/office/2006/metadata/contentType" xmlns:ma="http://schemas.microsoft.com/office/2006/metadata/properties/metaAttributes" ct:_="" ma:_="" ma:contentTypeName="Document" ma:contentTypeID="0x0101003077E6D4C54119439DB8E5381724DDAA" ma:contentTypeVersion="3" ma:contentTypeDescription="Create a new document." ma:contentTypeScope="" ma:versionID="35325c12c4b8970beabc35f2e2efcbb5">
   <xsd:schema xmlns:xsd="http://www.w3.org/2001/XMLSchema" xmlns:xs="http://www.w3.org/2001/XMLSchema" xmlns:p="http://schemas.microsoft.com/office/2006/metadata/properties" xmlns:ns2="67d1ba68-3275-44c2-9ddb-2f8511f2ccbb" targetNamespace="http://schemas.microsoft.com/office/2006/metadata/properties" ma:root="true" ma:fieldsID="33e6c1fa542cdacee9e5295060f101a2" ns2:_="">
     <xsd:import namespace="67d1ba68-3275-44c2-9ddb-2f8511f2ccbb"/>
@@ -7243,12 +6170,6 @@
 </ct:contentTypeSchema>
 </file>
 
-<file path=customXml/item2.xml><?xml version="1.0" encoding="utf-8"?>
-<p:properties xmlns:p="http://schemas.microsoft.com/office/2006/metadata/properties" xmlns:xsi="http://www.w3.org/2001/XMLSchema-instance" xmlns:pc="http://schemas.microsoft.com/office/infopath/2007/PartnerControls">
-  <documentManagement/>
-</p:properties>
-</file>
-
 <file path=customXml/item3.xml><?xml version="1.0" encoding="utf-8"?>
 <?mso-contentType ?>
 <FormTemplates xmlns="http://schemas.microsoft.com/sharepoint/v3/contenttype/forms">
@@ -7259,6 +6180,22 @@
 </file>
 
 <file path=customXml/itemProps1.xml><?xml version="1.0" encoding="utf-8"?>
+<ds:datastoreItem xmlns:ds="http://schemas.openxmlformats.org/officeDocument/2006/customXml" ds:itemID="{F4BD4880-0C9A-491D-872C-CB84E58DA4AE}">
+  <ds:schemaRefs>
+    <ds:schemaRef ds:uri="67d1ba68-3275-44c2-9ddb-2f8511f2ccbb"/>
+    <ds:schemaRef ds:uri="http://purl.org/dc/elements/1.1/"/>
+    <ds:schemaRef ds:uri="http://purl.org/dc/terms/"/>
+    <ds:schemaRef ds:uri="http://schemas.microsoft.com/office/infopath/2007/PartnerControls"/>
+    <ds:schemaRef ds:uri="http://schemas.openxmlformats.org/package/2006/metadata/core-properties"/>
+    <ds:schemaRef ds:uri="http://schemas.microsoft.com/office/2006/documentManagement/types"/>
+    <ds:schemaRef ds:uri="http://schemas.microsoft.com/office/2006/metadata/properties"/>
+    <ds:schemaRef ds:uri="http://www.w3.org/XML/1998/namespace"/>
+    <ds:schemaRef ds:uri="http://purl.org/dc/dcmitype/"/>
+  </ds:schemaRefs>
+</ds:datastoreItem>
+</file>
+
+<file path=customXml/itemProps2.xml><?xml version="1.0" encoding="utf-8"?>
 <ds:datastoreItem xmlns:ds="http://schemas.openxmlformats.org/officeDocument/2006/customXml" ds:itemID="{3A2EFE34-A918-4452-B6BD-4425E6B1970F}">
   <ds:schemaRefs>
     <ds:schemaRef ds:uri="http://schemas.microsoft.com/office/2006/metadata/contentType"/>
@@ -7276,22 +6213,6 @@
 </ds:datastoreItem>
 </file>
 
-<file path=customXml/itemProps2.xml><?xml version="1.0" encoding="utf-8"?>
-<ds:datastoreItem xmlns:ds="http://schemas.openxmlformats.org/officeDocument/2006/customXml" ds:itemID="{F4BD4880-0C9A-491D-872C-CB84E58DA4AE}">
-  <ds:schemaRefs>
-    <ds:schemaRef ds:uri="67d1ba68-3275-44c2-9ddb-2f8511f2ccbb"/>
-    <ds:schemaRef ds:uri="http://purl.org/dc/elements/1.1/"/>
-    <ds:schemaRef ds:uri="http://purl.org/dc/terms/"/>
-    <ds:schemaRef ds:uri="http://schemas.microsoft.com/office/infopath/2007/PartnerControls"/>
-    <ds:schemaRef ds:uri="http://schemas.openxmlformats.org/package/2006/metadata/core-properties"/>
-    <ds:schemaRef ds:uri="http://schemas.microsoft.com/office/2006/documentManagement/types"/>
-    <ds:schemaRef ds:uri="http://schemas.microsoft.com/office/2006/metadata/properties"/>
-    <ds:schemaRef ds:uri="http://www.w3.org/XML/1998/namespace"/>
-    <ds:schemaRef ds:uri="http://purl.org/dc/dcmitype/"/>
-  </ds:schemaRefs>
-</ds:datastoreItem>
-</file>
-
 <file path=customXml/itemProps3.xml><?xml version="1.0" encoding="utf-8"?>
 <ds:datastoreItem xmlns:ds="http://schemas.openxmlformats.org/officeDocument/2006/customXml" ds:itemID="{74BCA57B-8451-400D-AF6D-A9DBB4806AF2}">
   <ds:schemaRefs>

</xml_diff>